<commit_message>
feat: adding section (arvore de regressao)
</commit_message>
<xml_diff>
--- a/imagens.pptx
+++ b/imagens.pptx
@@ -16,6 +16,7 @@
     <p:sldId id="265" r:id="rId10"/>
     <p:sldId id="266" r:id="rId11"/>
     <p:sldId id="267" r:id="rId12"/>
+    <p:sldId id="268" r:id="rId13"/>
   </p:sldIdLst>
   <p:sldSz cx="12192000" cy="6858000"/>
   <p:notesSz cx="6858000" cy="9144000"/>
@@ -269,7 +270,7 @@
           <a:p>
             <a:fld id="{20C2FEA9-41FB-40F1-A8FA-A19BCC6F7DB1}" type="datetimeFigureOut">
               <a:rPr lang="pt-BR" smtClean="0"/>
-              <a:t>16/12/2023</a:t>
+              <a:t>30/06/2024</a:t>
             </a:fld>
             <a:endParaRPr lang="pt-BR"/>
           </a:p>
@@ -467,7 +468,7 @@
           <a:p>
             <a:fld id="{20C2FEA9-41FB-40F1-A8FA-A19BCC6F7DB1}" type="datetimeFigureOut">
               <a:rPr lang="pt-BR" smtClean="0"/>
-              <a:t>16/12/2023</a:t>
+              <a:t>30/06/2024</a:t>
             </a:fld>
             <a:endParaRPr lang="pt-BR"/>
           </a:p>
@@ -675,7 +676,7 @@
           <a:p>
             <a:fld id="{20C2FEA9-41FB-40F1-A8FA-A19BCC6F7DB1}" type="datetimeFigureOut">
               <a:rPr lang="pt-BR" smtClean="0"/>
-              <a:t>16/12/2023</a:t>
+              <a:t>30/06/2024</a:t>
             </a:fld>
             <a:endParaRPr lang="pt-BR"/>
           </a:p>
@@ -873,7 +874,7 @@
           <a:p>
             <a:fld id="{20C2FEA9-41FB-40F1-A8FA-A19BCC6F7DB1}" type="datetimeFigureOut">
               <a:rPr lang="pt-BR" smtClean="0"/>
-              <a:t>16/12/2023</a:t>
+              <a:t>30/06/2024</a:t>
             </a:fld>
             <a:endParaRPr lang="pt-BR"/>
           </a:p>
@@ -1148,7 +1149,7 @@
           <a:p>
             <a:fld id="{20C2FEA9-41FB-40F1-A8FA-A19BCC6F7DB1}" type="datetimeFigureOut">
               <a:rPr lang="pt-BR" smtClean="0"/>
-              <a:t>16/12/2023</a:t>
+              <a:t>30/06/2024</a:t>
             </a:fld>
             <a:endParaRPr lang="pt-BR"/>
           </a:p>
@@ -1413,7 +1414,7 @@
           <a:p>
             <a:fld id="{20C2FEA9-41FB-40F1-A8FA-A19BCC6F7DB1}" type="datetimeFigureOut">
               <a:rPr lang="pt-BR" smtClean="0"/>
-              <a:t>16/12/2023</a:t>
+              <a:t>30/06/2024</a:t>
             </a:fld>
             <a:endParaRPr lang="pt-BR"/>
           </a:p>
@@ -1825,7 +1826,7 @@
           <a:p>
             <a:fld id="{20C2FEA9-41FB-40F1-A8FA-A19BCC6F7DB1}" type="datetimeFigureOut">
               <a:rPr lang="pt-BR" smtClean="0"/>
-              <a:t>16/12/2023</a:t>
+              <a:t>30/06/2024</a:t>
             </a:fld>
             <a:endParaRPr lang="pt-BR"/>
           </a:p>
@@ -1966,7 +1967,7 @@
           <a:p>
             <a:fld id="{20C2FEA9-41FB-40F1-A8FA-A19BCC6F7DB1}" type="datetimeFigureOut">
               <a:rPr lang="pt-BR" smtClean="0"/>
-              <a:t>16/12/2023</a:t>
+              <a:t>30/06/2024</a:t>
             </a:fld>
             <a:endParaRPr lang="pt-BR"/>
           </a:p>
@@ -2079,7 +2080,7 @@
           <a:p>
             <a:fld id="{20C2FEA9-41FB-40F1-A8FA-A19BCC6F7DB1}" type="datetimeFigureOut">
               <a:rPr lang="pt-BR" smtClean="0"/>
-              <a:t>16/12/2023</a:t>
+              <a:t>30/06/2024</a:t>
             </a:fld>
             <a:endParaRPr lang="pt-BR"/>
           </a:p>
@@ -2390,7 +2391,7 @@
           <a:p>
             <a:fld id="{20C2FEA9-41FB-40F1-A8FA-A19BCC6F7DB1}" type="datetimeFigureOut">
               <a:rPr lang="pt-BR" smtClean="0"/>
-              <a:t>16/12/2023</a:t>
+              <a:t>30/06/2024</a:t>
             </a:fld>
             <a:endParaRPr lang="pt-BR"/>
           </a:p>
@@ -2678,7 +2679,7 @@
           <a:p>
             <a:fld id="{20C2FEA9-41FB-40F1-A8FA-A19BCC6F7DB1}" type="datetimeFigureOut">
               <a:rPr lang="pt-BR" smtClean="0"/>
-              <a:t>16/12/2023</a:t>
+              <a:t>30/06/2024</a:t>
             </a:fld>
             <a:endParaRPr lang="pt-BR"/>
           </a:p>
@@ -2919,7 +2920,7 @@
           <a:p>
             <a:fld id="{20C2FEA9-41FB-40F1-A8FA-A19BCC6F7DB1}" type="datetimeFigureOut">
               <a:rPr lang="pt-BR" smtClean="0"/>
-              <a:t>16/12/2023</a:t>
+              <a:t>30/06/2024</a:t>
             </a:fld>
             <a:endParaRPr lang="pt-BR"/>
           </a:p>
@@ -5328,8 +5329,8 @@
           </a:fontRef>
         </p:style>
       </p:cxnSp>
-      <mc:AlternateContent xmlns:mc="http://schemas.openxmlformats.org/markup-compatibility/2006">
-        <mc:Choice xmlns:a14="http://schemas.microsoft.com/office/drawing/2010/main" Requires="a14">
+      <mc:AlternateContent xmlns:mc="http://schemas.openxmlformats.org/markup-compatibility/2006" xmlns:a14="http://schemas.microsoft.com/office/drawing/2010/main">
+        <mc:Choice Requires="a14">
           <p:sp>
             <p:nvSpPr>
               <p:cNvPr id="22" name="CaixaDeTexto 21">
@@ -5398,7 +5399,7 @@
             </p:txBody>
           </p:sp>
         </mc:Choice>
-        <mc:Fallback>
+        <mc:Fallback xmlns="">
           <p:sp>
             <p:nvSpPr>
               <p:cNvPr id="22" name="CaixaDeTexto 21">
@@ -5443,8 +5444,8 @@
           </p:sp>
         </mc:Fallback>
       </mc:AlternateContent>
-      <mc:AlternateContent xmlns:mc="http://schemas.openxmlformats.org/markup-compatibility/2006">
-        <mc:Choice xmlns:a14="http://schemas.microsoft.com/office/drawing/2010/main" Requires="a14">
+      <mc:AlternateContent xmlns:mc="http://schemas.openxmlformats.org/markup-compatibility/2006" xmlns:a14="http://schemas.microsoft.com/office/drawing/2010/main">
+        <mc:Choice Requires="a14">
           <p:sp>
             <p:nvSpPr>
               <p:cNvPr id="23" name="CaixaDeTexto 22">
@@ -5519,7 +5520,7 @@
             </p:txBody>
           </p:sp>
         </mc:Choice>
-        <mc:Fallback>
+        <mc:Fallback xmlns="">
           <p:sp>
             <p:nvSpPr>
               <p:cNvPr id="23" name="CaixaDeTexto 22">
@@ -5609,8 +5610,8 @@
           </a:fontRef>
         </p:style>
       </p:cxnSp>
-      <mc:AlternateContent xmlns:mc="http://schemas.openxmlformats.org/markup-compatibility/2006">
-        <mc:Choice xmlns:a14="http://schemas.microsoft.com/office/drawing/2010/main" Requires="a14">
+      <mc:AlternateContent xmlns:mc="http://schemas.openxmlformats.org/markup-compatibility/2006" xmlns:a14="http://schemas.microsoft.com/office/drawing/2010/main">
+        <mc:Choice Requires="a14">
           <p:sp>
             <p:nvSpPr>
               <p:cNvPr id="26" name="CaixaDeTexto 25">
@@ -5724,7 +5725,7 @@
             </p:txBody>
           </p:sp>
         </mc:Choice>
-        <mc:Fallback>
+        <mc:Fallback xmlns="">
           <p:sp>
             <p:nvSpPr>
               <p:cNvPr id="26" name="CaixaDeTexto 25">
@@ -5773,6 +5774,2770 @@
     <p:extLst>
       <p:ext uri="{BB962C8B-B14F-4D97-AF65-F5344CB8AC3E}">
         <p14:creationId xmlns:p14="http://schemas.microsoft.com/office/powerpoint/2010/main" val="1233441381"/>
+      </p:ext>
+    </p:extLst>
+  </p:cSld>
+  <p:clrMapOvr>
+    <a:masterClrMapping/>
+  </p:clrMapOvr>
+</p:sld>
+</file>
+
+<file path=ppt/slides/slide12.xml><?xml version="1.0" encoding="utf-8"?>
+<p:sld xmlns:a="http://schemas.openxmlformats.org/drawingml/2006/main" xmlns:r="http://schemas.openxmlformats.org/officeDocument/2006/relationships" xmlns:p="http://schemas.openxmlformats.org/presentationml/2006/main">
+  <p:cSld>
+    <p:spTree>
+      <p:nvGrpSpPr>
+        <p:cNvPr id="1" name=""/>
+        <p:cNvGrpSpPr/>
+        <p:nvPr/>
+      </p:nvGrpSpPr>
+      <p:grpSpPr>
+        <a:xfrm>
+          <a:off x="0" y="0"/>
+          <a:ext cx="0" cy="0"/>
+          <a:chOff x="0" y="0"/>
+          <a:chExt cx="0" cy="0"/>
+        </a:xfrm>
+      </p:grpSpPr>
+      <p:sp>
+        <p:nvSpPr>
+          <p:cNvPr id="4" name="Elipse 3">
+            <a:extLst>
+              <a:ext uri="{FF2B5EF4-FFF2-40B4-BE49-F238E27FC236}">
+                <a16:creationId xmlns:a16="http://schemas.microsoft.com/office/drawing/2014/main" id="{BC73A39F-7A0A-50DD-41E4-579E08335006}"/>
+              </a:ext>
+            </a:extLst>
+          </p:cNvPr>
+          <p:cNvSpPr/>
+          <p:nvPr/>
+        </p:nvSpPr>
+        <p:spPr>
+          <a:xfrm>
+            <a:off x="5448440" y="2180168"/>
+            <a:ext cx="720000" cy="720000"/>
+          </a:xfrm>
+          <a:prstGeom prst="ellipse">
+            <a:avLst/>
+          </a:prstGeom>
+          <a:noFill/>
+          <a:ln>
+            <a:solidFill>
+              <a:schemeClr val="tx1"/>
+            </a:solidFill>
+          </a:ln>
+        </p:spPr>
+        <p:style>
+          <a:lnRef idx="2">
+            <a:schemeClr val="accent1">
+              <a:shade val="15000"/>
+            </a:schemeClr>
+          </a:lnRef>
+          <a:fillRef idx="1">
+            <a:schemeClr val="accent1"/>
+          </a:fillRef>
+          <a:effectRef idx="0">
+            <a:schemeClr val="accent1"/>
+          </a:effectRef>
+          <a:fontRef idx="minor">
+            <a:schemeClr val="lt1"/>
+          </a:fontRef>
+        </p:style>
+        <p:txBody>
+          <a:bodyPr rtlCol="0" anchor="ctr"/>
+          <a:lstStyle/>
+          <a:p>
+            <a:pPr algn="ctr"/>
+            <a:endParaRPr lang="pt-BR"/>
+          </a:p>
+        </p:txBody>
+      </p:sp>
+      <p:sp>
+        <p:nvSpPr>
+          <p:cNvPr id="5" name="Elipse 4">
+            <a:extLst>
+              <a:ext uri="{FF2B5EF4-FFF2-40B4-BE49-F238E27FC236}">
+                <a16:creationId xmlns:a16="http://schemas.microsoft.com/office/drawing/2014/main" id="{39656CA3-D773-C807-AD1F-10E0A07A06A4}"/>
+              </a:ext>
+            </a:extLst>
+          </p:cNvPr>
+          <p:cNvSpPr/>
+          <p:nvPr/>
+        </p:nvSpPr>
+        <p:spPr>
+          <a:xfrm>
+            <a:off x="4728440" y="2971351"/>
+            <a:ext cx="720000" cy="720000"/>
+          </a:xfrm>
+          <a:prstGeom prst="ellipse">
+            <a:avLst/>
+          </a:prstGeom>
+          <a:solidFill>
+            <a:srgbClr val="C00000">
+              <a:alpha val="15000"/>
+            </a:srgbClr>
+          </a:solidFill>
+          <a:ln>
+            <a:solidFill>
+              <a:schemeClr val="tx1"/>
+            </a:solidFill>
+          </a:ln>
+        </p:spPr>
+        <p:style>
+          <a:lnRef idx="2">
+            <a:schemeClr val="accent1">
+              <a:shade val="15000"/>
+            </a:schemeClr>
+          </a:lnRef>
+          <a:fillRef idx="1">
+            <a:schemeClr val="accent1"/>
+          </a:fillRef>
+          <a:effectRef idx="0">
+            <a:schemeClr val="accent1"/>
+          </a:effectRef>
+          <a:fontRef idx="minor">
+            <a:schemeClr val="lt1"/>
+          </a:fontRef>
+        </p:style>
+        <p:txBody>
+          <a:bodyPr rtlCol="0" anchor="ctr"/>
+          <a:lstStyle/>
+          <a:p>
+            <a:pPr algn="ctr"/>
+            <a:endParaRPr lang="pt-BR"/>
+          </a:p>
+        </p:txBody>
+      </p:sp>
+      <p:sp>
+        <p:nvSpPr>
+          <p:cNvPr id="6" name="Elipse 5">
+            <a:extLst>
+              <a:ext uri="{FF2B5EF4-FFF2-40B4-BE49-F238E27FC236}">
+                <a16:creationId xmlns:a16="http://schemas.microsoft.com/office/drawing/2014/main" id="{2AA9239D-16D1-4039-AAA4-14E0DAD6B4E4}"/>
+              </a:ext>
+            </a:extLst>
+          </p:cNvPr>
+          <p:cNvSpPr/>
+          <p:nvPr/>
+        </p:nvSpPr>
+        <p:spPr>
+          <a:xfrm>
+            <a:off x="6168440" y="2971351"/>
+            <a:ext cx="720000" cy="720000"/>
+          </a:xfrm>
+          <a:prstGeom prst="ellipse">
+            <a:avLst/>
+          </a:prstGeom>
+          <a:solidFill>
+            <a:schemeClr val="accent1">
+              <a:alpha val="15000"/>
+            </a:schemeClr>
+          </a:solidFill>
+          <a:ln>
+            <a:solidFill>
+              <a:schemeClr val="tx1"/>
+            </a:solidFill>
+          </a:ln>
+        </p:spPr>
+        <p:style>
+          <a:lnRef idx="2">
+            <a:schemeClr val="accent1">
+              <a:shade val="15000"/>
+            </a:schemeClr>
+          </a:lnRef>
+          <a:fillRef idx="1">
+            <a:schemeClr val="accent1"/>
+          </a:fillRef>
+          <a:effectRef idx="0">
+            <a:schemeClr val="accent1"/>
+          </a:effectRef>
+          <a:fontRef idx="minor">
+            <a:schemeClr val="lt1"/>
+          </a:fontRef>
+        </p:style>
+        <p:txBody>
+          <a:bodyPr rtlCol="0" anchor="ctr"/>
+          <a:lstStyle/>
+          <a:p>
+            <a:pPr algn="ctr"/>
+            <a:endParaRPr lang="pt-BR"/>
+          </a:p>
+        </p:txBody>
+      </p:sp>
+      <p:cxnSp>
+        <p:nvCxnSpPr>
+          <p:cNvPr id="8" name="Conector reto 7">
+            <a:extLst>
+              <a:ext uri="{FF2B5EF4-FFF2-40B4-BE49-F238E27FC236}">
+                <a16:creationId xmlns:a16="http://schemas.microsoft.com/office/drawing/2014/main" id="{9004A710-852B-94FB-C77F-C8792785997C}"/>
+              </a:ext>
+            </a:extLst>
+          </p:cNvPr>
+          <p:cNvCxnSpPr>
+            <a:cxnSpLocks/>
+            <a:stCxn id="4" idx="3"/>
+            <a:endCxn id="5" idx="7"/>
+          </p:cNvCxnSpPr>
+          <p:nvPr/>
+        </p:nvCxnSpPr>
+        <p:spPr>
+          <a:xfrm flipH="1">
+            <a:off x="5342998" y="2794726"/>
+            <a:ext cx="210884" cy="282067"/>
+          </a:xfrm>
+          <a:prstGeom prst="line">
+            <a:avLst/>
+          </a:prstGeom>
+          <a:ln w="19050">
+            <a:solidFill>
+              <a:schemeClr val="tx1"/>
+            </a:solidFill>
+          </a:ln>
+        </p:spPr>
+        <p:style>
+          <a:lnRef idx="1">
+            <a:schemeClr val="accent1"/>
+          </a:lnRef>
+          <a:fillRef idx="0">
+            <a:schemeClr val="accent1"/>
+          </a:fillRef>
+          <a:effectRef idx="0">
+            <a:schemeClr val="accent1"/>
+          </a:effectRef>
+          <a:fontRef idx="minor">
+            <a:schemeClr val="tx1"/>
+          </a:fontRef>
+        </p:style>
+      </p:cxnSp>
+      <p:cxnSp>
+        <p:nvCxnSpPr>
+          <p:cNvPr id="11" name="Conector reto 10">
+            <a:extLst>
+              <a:ext uri="{FF2B5EF4-FFF2-40B4-BE49-F238E27FC236}">
+                <a16:creationId xmlns:a16="http://schemas.microsoft.com/office/drawing/2014/main" id="{FD6A5C19-4DCF-77A5-2B6F-054FEDD8C26D}"/>
+              </a:ext>
+            </a:extLst>
+          </p:cNvPr>
+          <p:cNvCxnSpPr>
+            <a:cxnSpLocks/>
+            <a:stCxn id="4" idx="5"/>
+            <a:endCxn id="6" idx="1"/>
+          </p:cNvCxnSpPr>
+          <p:nvPr/>
+        </p:nvCxnSpPr>
+        <p:spPr>
+          <a:xfrm>
+            <a:off x="6062998" y="2794726"/>
+            <a:ext cx="210884" cy="282067"/>
+          </a:xfrm>
+          <a:prstGeom prst="line">
+            <a:avLst/>
+          </a:prstGeom>
+          <a:ln w="19050">
+            <a:solidFill>
+              <a:schemeClr val="tx1"/>
+            </a:solidFill>
+          </a:ln>
+        </p:spPr>
+        <p:style>
+          <a:lnRef idx="1">
+            <a:schemeClr val="accent1"/>
+          </a:lnRef>
+          <a:fillRef idx="0">
+            <a:schemeClr val="accent1"/>
+          </a:fillRef>
+          <a:effectRef idx="0">
+            <a:schemeClr val="accent1"/>
+          </a:effectRef>
+          <a:fontRef idx="minor">
+            <a:schemeClr val="tx1"/>
+          </a:fontRef>
+        </p:style>
+      </p:cxnSp>
+      <p:sp>
+        <p:nvSpPr>
+          <p:cNvPr id="19" name="Elipse 18">
+            <a:extLst>
+              <a:ext uri="{FF2B5EF4-FFF2-40B4-BE49-F238E27FC236}">
+                <a16:creationId xmlns:a16="http://schemas.microsoft.com/office/drawing/2014/main" id="{8E43C75A-F1E4-B4F5-26C2-CB13D2CB72D4}"/>
+              </a:ext>
+            </a:extLst>
+          </p:cNvPr>
+          <p:cNvSpPr/>
+          <p:nvPr/>
+        </p:nvSpPr>
+        <p:spPr>
+          <a:xfrm>
+            <a:off x="5812736" y="2255543"/>
+            <a:ext cx="72000" cy="72000"/>
+          </a:xfrm>
+          <a:prstGeom prst="ellipse">
+            <a:avLst/>
+          </a:prstGeom>
+          <a:solidFill>
+            <a:srgbClr val="C00000"/>
+          </a:solidFill>
+          <a:ln>
+            <a:noFill/>
+          </a:ln>
+        </p:spPr>
+        <p:style>
+          <a:lnRef idx="2">
+            <a:schemeClr val="accent1">
+              <a:shade val="15000"/>
+            </a:schemeClr>
+          </a:lnRef>
+          <a:fillRef idx="1">
+            <a:schemeClr val="accent1"/>
+          </a:fillRef>
+          <a:effectRef idx="0">
+            <a:schemeClr val="accent1"/>
+          </a:effectRef>
+          <a:fontRef idx="minor">
+            <a:schemeClr val="lt1"/>
+          </a:fontRef>
+        </p:style>
+        <p:txBody>
+          <a:bodyPr rtlCol="0" anchor="ctr"/>
+          <a:lstStyle/>
+          <a:p>
+            <a:pPr algn="ctr"/>
+            <a:endParaRPr lang="pt-BR"/>
+          </a:p>
+        </p:txBody>
+      </p:sp>
+      <p:sp>
+        <p:nvSpPr>
+          <p:cNvPr id="20" name="Elipse 19">
+            <a:extLst>
+              <a:ext uri="{FF2B5EF4-FFF2-40B4-BE49-F238E27FC236}">
+                <a16:creationId xmlns:a16="http://schemas.microsoft.com/office/drawing/2014/main" id="{B55375F6-DE79-2E36-0C1B-79A2887AACC6}"/>
+              </a:ext>
+            </a:extLst>
+          </p:cNvPr>
+          <p:cNvSpPr/>
+          <p:nvPr/>
+        </p:nvSpPr>
+        <p:spPr>
+          <a:xfrm>
+            <a:off x="5960916" y="2615343"/>
+            <a:ext cx="72000" cy="72000"/>
+          </a:xfrm>
+          <a:prstGeom prst="ellipse">
+            <a:avLst/>
+          </a:prstGeom>
+          <a:solidFill>
+            <a:srgbClr val="C00000"/>
+          </a:solidFill>
+          <a:ln>
+            <a:noFill/>
+          </a:ln>
+        </p:spPr>
+        <p:style>
+          <a:lnRef idx="2">
+            <a:schemeClr val="accent1">
+              <a:shade val="15000"/>
+            </a:schemeClr>
+          </a:lnRef>
+          <a:fillRef idx="1">
+            <a:schemeClr val="accent1"/>
+          </a:fillRef>
+          <a:effectRef idx="0">
+            <a:schemeClr val="accent1"/>
+          </a:effectRef>
+          <a:fontRef idx="minor">
+            <a:schemeClr val="lt1"/>
+          </a:fontRef>
+        </p:style>
+        <p:txBody>
+          <a:bodyPr rtlCol="0" anchor="ctr"/>
+          <a:lstStyle/>
+          <a:p>
+            <a:pPr algn="ctr"/>
+            <a:endParaRPr lang="pt-BR"/>
+          </a:p>
+        </p:txBody>
+      </p:sp>
+      <p:sp>
+        <p:nvSpPr>
+          <p:cNvPr id="21" name="Elipse 20">
+            <a:extLst>
+              <a:ext uri="{FF2B5EF4-FFF2-40B4-BE49-F238E27FC236}">
+                <a16:creationId xmlns:a16="http://schemas.microsoft.com/office/drawing/2014/main" id="{7B965AC4-6409-9DE0-A695-5F35DFF9680D}"/>
+              </a:ext>
+            </a:extLst>
+          </p:cNvPr>
+          <p:cNvSpPr/>
+          <p:nvPr/>
+        </p:nvSpPr>
+        <p:spPr>
+          <a:xfrm>
+            <a:off x="5795780" y="2722726"/>
+            <a:ext cx="72000" cy="72000"/>
+          </a:xfrm>
+          <a:prstGeom prst="ellipse">
+            <a:avLst/>
+          </a:prstGeom>
+          <a:solidFill>
+            <a:srgbClr val="C00000"/>
+          </a:solidFill>
+          <a:ln>
+            <a:noFill/>
+          </a:ln>
+        </p:spPr>
+        <p:style>
+          <a:lnRef idx="2">
+            <a:schemeClr val="accent1">
+              <a:shade val="15000"/>
+            </a:schemeClr>
+          </a:lnRef>
+          <a:fillRef idx="1">
+            <a:schemeClr val="accent1"/>
+          </a:fillRef>
+          <a:effectRef idx="0">
+            <a:schemeClr val="accent1"/>
+          </a:effectRef>
+          <a:fontRef idx="minor">
+            <a:schemeClr val="lt1"/>
+          </a:fontRef>
+        </p:style>
+        <p:txBody>
+          <a:bodyPr rtlCol="0" anchor="ctr"/>
+          <a:lstStyle/>
+          <a:p>
+            <a:pPr algn="ctr"/>
+            <a:endParaRPr lang="pt-BR"/>
+          </a:p>
+        </p:txBody>
+      </p:sp>
+      <p:sp>
+        <p:nvSpPr>
+          <p:cNvPr id="22" name="Elipse 21">
+            <a:extLst>
+              <a:ext uri="{FF2B5EF4-FFF2-40B4-BE49-F238E27FC236}">
+                <a16:creationId xmlns:a16="http://schemas.microsoft.com/office/drawing/2014/main" id="{639E8D6A-432F-7DAD-9C58-C719E18AD697}"/>
+              </a:ext>
+            </a:extLst>
+          </p:cNvPr>
+          <p:cNvSpPr/>
+          <p:nvPr/>
+        </p:nvSpPr>
+        <p:spPr>
+          <a:xfrm>
+            <a:off x="5609144" y="2508637"/>
+            <a:ext cx="72000" cy="72000"/>
+          </a:xfrm>
+          <a:prstGeom prst="ellipse">
+            <a:avLst/>
+          </a:prstGeom>
+          <a:solidFill>
+            <a:srgbClr val="C00000"/>
+          </a:solidFill>
+          <a:ln>
+            <a:noFill/>
+          </a:ln>
+        </p:spPr>
+        <p:style>
+          <a:lnRef idx="2">
+            <a:schemeClr val="accent1">
+              <a:shade val="15000"/>
+            </a:schemeClr>
+          </a:lnRef>
+          <a:fillRef idx="1">
+            <a:schemeClr val="accent1"/>
+          </a:fillRef>
+          <a:effectRef idx="0">
+            <a:schemeClr val="accent1"/>
+          </a:effectRef>
+          <a:fontRef idx="minor">
+            <a:schemeClr val="lt1"/>
+          </a:fontRef>
+        </p:style>
+        <p:txBody>
+          <a:bodyPr rtlCol="0" anchor="ctr"/>
+          <a:lstStyle/>
+          <a:p>
+            <a:pPr algn="ctr"/>
+            <a:endParaRPr lang="pt-BR"/>
+          </a:p>
+        </p:txBody>
+      </p:sp>
+      <p:sp>
+        <p:nvSpPr>
+          <p:cNvPr id="23" name="Elipse 22">
+            <a:extLst>
+              <a:ext uri="{FF2B5EF4-FFF2-40B4-BE49-F238E27FC236}">
+                <a16:creationId xmlns:a16="http://schemas.microsoft.com/office/drawing/2014/main" id="{A2786D27-B5D0-9AE3-2C6B-355E38B1C342}"/>
+              </a:ext>
+            </a:extLst>
+          </p:cNvPr>
+          <p:cNvSpPr/>
+          <p:nvPr/>
+        </p:nvSpPr>
+        <p:spPr>
+          <a:xfrm>
+            <a:off x="5609144" y="2320237"/>
+            <a:ext cx="72000" cy="72000"/>
+          </a:xfrm>
+          <a:prstGeom prst="ellipse">
+            <a:avLst/>
+          </a:prstGeom>
+          <a:solidFill>
+            <a:schemeClr val="accent1"/>
+          </a:solidFill>
+          <a:ln>
+            <a:noFill/>
+          </a:ln>
+        </p:spPr>
+        <p:style>
+          <a:lnRef idx="2">
+            <a:schemeClr val="accent1">
+              <a:shade val="15000"/>
+            </a:schemeClr>
+          </a:lnRef>
+          <a:fillRef idx="1">
+            <a:schemeClr val="accent1"/>
+          </a:fillRef>
+          <a:effectRef idx="0">
+            <a:schemeClr val="accent1"/>
+          </a:effectRef>
+          <a:fontRef idx="minor">
+            <a:schemeClr val="lt1"/>
+          </a:fontRef>
+        </p:style>
+        <p:txBody>
+          <a:bodyPr rtlCol="0" anchor="ctr"/>
+          <a:lstStyle/>
+          <a:p>
+            <a:pPr algn="ctr"/>
+            <a:endParaRPr lang="pt-BR"/>
+          </a:p>
+        </p:txBody>
+      </p:sp>
+      <p:sp>
+        <p:nvSpPr>
+          <p:cNvPr id="25" name="Elipse 24">
+            <a:extLst>
+              <a:ext uri="{FF2B5EF4-FFF2-40B4-BE49-F238E27FC236}">
+                <a16:creationId xmlns:a16="http://schemas.microsoft.com/office/drawing/2014/main" id="{15FA9FD4-F462-7956-5CD7-C12F69DAFACF}"/>
+              </a:ext>
+            </a:extLst>
+          </p:cNvPr>
+          <p:cNvSpPr/>
+          <p:nvPr/>
+        </p:nvSpPr>
+        <p:spPr>
+          <a:xfrm>
+            <a:off x="5967976" y="2392237"/>
+            <a:ext cx="72000" cy="72000"/>
+          </a:xfrm>
+          <a:prstGeom prst="ellipse">
+            <a:avLst/>
+          </a:prstGeom>
+          <a:solidFill>
+            <a:schemeClr val="accent1"/>
+          </a:solidFill>
+          <a:ln>
+            <a:noFill/>
+          </a:ln>
+        </p:spPr>
+        <p:style>
+          <a:lnRef idx="2">
+            <a:schemeClr val="accent1">
+              <a:shade val="15000"/>
+            </a:schemeClr>
+          </a:lnRef>
+          <a:fillRef idx="1">
+            <a:schemeClr val="accent1"/>
+          </a:fillRef>
+          <a:effectRef idx="0">
+            <a:schemeClr val="accent1"/>
+          </a:effectRef>
+          <a:fontRef idx="minor">
+            <a:schemeClr val="lt1"/>
+          </a:fontRef>
+        </p:style>
+        <p:txBody>
+          <a:bodyPr rtlCol="0" anchor="ctr"/>
+          <a:lstStyle/>
+          <a:p>
+            <a:pPr algn="ctr"/>
+            <a:endParaRPr lang="pt-BR"/>
+          </a:p>
+        </p:txBody>
+      </p:sp>
+      <p:sp>
+        <p:nvSpPr>
+          <p:cNvPr id="26" name="Elipse 25">
+            <a:extLst>
+              <a:ext uri="{FF2B5EF4-FFF2-40B4-BE49-F238E27FC236}">
+                <a16:creationId xmlns:a16="http://schemas.microsoft.com/office/drawing/2014/main" id="{0FE19FDB-281F-7B72-4FB8-B40280BE610E}"/>
+              </a:ext>
+            </a:extLst>
+          </p:cNvPr>
+          <p:cNvSpPr/>
+          <p:nvPr/>
+        </p:nvSpPr>
+        <p:spPr>
+          <a:xfrm>
+            <a:off x="5604110" y="2686725"/>
+            <a:ext cx="72000" cy="72000"/>
+          </a:xfrm>
+          <a:prstGeom prst="ellipse">
+            <a:avLst/>
+          </a:prstGeom>
+          <a:solidFill>
+            <a:schemeClr val="accent1"/>
+          </a:solidFill>
+          <a:ln>
+            <a:noFill/>
+          </a:ln>
+        </p:spPr>
+        <p:style>
+          <a:lnRef idx="2">
+            <a:schemeClr val="accent1">
+              <a:shade val="15000"/>
+            </a:schemeClr>
+          </a:lnRef>
+          <a:fillRef idx="1">
+            <a:schemeClr val="accent1"/>
+          </a:fillRef>
+          <a:effectRef idx="0">
+            <a:schemeClr val="accent1"/>
+          </a:effectRef>
+          <a:fontRef idx="minor">
+            <a:schemeClr val="lt1"/>
+          </a:fontRef>
+        </p:style>
+        <p:txBody>
+          <a:bodyPr rtlCol="0" anchor="ctr"/>
+          <a:lstStyle/>
+          <a:p>
+            <a:pPr algn="ctr"/>
+            <a:endParaRPr lang="pt-BR"/>
+          </a:p>
+        </p:txBody>
+      </p:sp>
+      <p:sp>
+        <p:nvSpPr>
+          <p:cNvPr id="27" name="Elipse 26">
+            <a:extLst>
+              <a:ext uri="{FF2B5EF4-FFF2-40B4-BE49-F238E27FC236}">
+                <a16:creationId xmlns:a16="http://schemas.microsoft.com/office/drawing/2014/main" id="{3F8E2080-0172-6C1F-9290-D3007FB0E2F7}"/>
+              </a:ext>
+            </a:extLst>
+          </p:cNvPr>
+          <p:cNvSpPr/>
+          <p:nvPr/>
+        </p:nvSpPr>
+        <p:spPr>
+          <a:xfrm>
+            <a:off x="5788560" y="2464237"/>
+            <a:ext cx="72000" cy="72000"/>
+          </a:xfrm>
+          <a:prstGeom prst="ellipse">
+            <a:avLst/>
+          </a:prstGeom>
+          <a:solidFill>
+            <a:schemeClr val="accent1"/>
+          </a:solidFill>
+          <a:ln>
+            <a:noFill/>
+          </a:ln>
+        </p:spPr>
+        <p:style>
+          <a:lnRef idx="2">
+            <a:schemeClr val="accent1">
+              <a:shade val="15000"/>
+            </a:schemeClr>
+          </a:lnRef>
+          <a:fillRef idx="1">
+            <a:schemeClr val="accent1"/>
+          </a:fillRef>
+          <a:effectRef idx="0">
+            <a:schemeClr val="accent1"/>
+          </a:effectRef>
+          <a:fontRef idx="minor">
+            <a:schemeClr val="lt1"/>
+          </a:fontRef>
+        </p:style>
+        <p:txBody>
+          <a:bodyPr rtlCol="0" anchor="ctr"/>
+          <a:lstStyle/>
+          <a:p>
+            <a:pPr algn="ctr"/>
+            <a:endParaRPr lang="pt-BR"/>
+          </a:p>
+        </p:txBody>
+      </p:sp>
+      <p:sp>
+        <p:nvSpPr>
+          <p:cNvPr id="28" name="Elipse 27">
+            <a:extLst>
+              <a:ext uri="{FF2B5EF4-FFF2-40B4-BE49-F238E27FC236}">
+                <a16:creationId xmlns:a16="http://schemas.microsoft.com/office/drawing/2014/main" id="{08F62A29-E444-CEFD-82BE-380B2AE75037}"/>
+              </a:ext>
+            </a:extLst>
+          </p:cNvPr>
+          <p:cNvSpPr/>
+          <p:nvPr/>
+        </p:nvSpPr>
+        <p:spPr>
+          <a:xfrm>
+            <a:off x="7995788" y="2186130"/>
+            <a:ext cx="720000" cy="720000"/>
+          </a:xfrm>
+          <a:prstGeom prst="ellipse">
+            <a:avLst/>
+          </a:prstGeom>
+          <a:noFill/>
+          <a:ln>
+            <a:solidFill>
+              <a:schemeClr val="tx1"/>
+            </a:solidFill>
+          </a:ln>
+        </p:spPr>
+        <p:style>
+          <a:lnRef idx="2">
+            <a:schemeClr val="accent1">
+              <a:shade val="15000"/>
+            </a:schemeClr>
+          </a:lnRef>
+          <a:fillRef idx="1">
+            <a:schemeClr val="accent1"/>
+          </a:fillRef>
+          <a:effectRef idx="0">
+            <a:schemeClr val="accent1"/>
+          </a:effectRef>
+          <a:fontRef idx="minor">
+            <a:schemeClr val="lt1"/>
+          </a:fontRef>
+        </p:style>
+        <p:txBody>
+          <a:bodyPr rtlCol="0" anchor="ctr"/>
+          <a:lstStyle/>
+          <a:p>
+            <a:pPr algn="ctr"/>
+            <a:endParaRPr lang="pt-BR"/>
+          </a:p>
+        </p:txBody>
+      </p:sp>
+      <p:sp>
+        <p:nvSpPr>
+          <p:cNvPr id="29" name="Elipse 28">
+            <a:extLst>
+              <a:ext uri="{FF2B5EF4-FFF2-40B4-BE49-F238E27FC236}">
+                <a16:creationId xmlns:a16="http://schemas.microsoft.com/office/drawing/2014/main" id="{091663C6-A477-5010-CD10-12CE0997D8D3}"/>
+              </a:ext>
+            </a:extLst>
+          </p:cNvPr>
+          <p:cNvSpPr/>
+          <p:nvPr/>
+        </p:nvSpPr>
+        <p:spPr>
+          <a:xfrm>
+            <a:off x="7280445" y="2976944"/>
+            <a:ext cx="720000" cy="720000"/>
+          </a:xfrm>
+          <a:prstGeom prst="ellipse">
+            <a:avLst/>
+          </a:prstGeom>
+          <a:solidFill>
+            <a:srgbClr val="C00000">
+              <a:alpha val="15000"/>
+            </a:srgbClr>
+          </a:solidFill>
+          <a:ln>
+            <a:solidFill>
+              <a:schemeClr val="tx1"/>
+            </a:solidFill>
+          </a:ln>
+        </p:spPr>
+        <p:style>
+          <a:lnRef idx="2">
+            <a:schemeClr val="accent1">
+              <a:shade val="15000"/>
+            </a:schemeClr>
+          </a:lnRef>
+          <a:fillRef idx="1">
+            <a:schemeClr val="accent1"/>
+          </a:fillRef>
+          <a:effectRef idx="0">
+            <a:schemeClr val="accent1"/>
+          </a:effectRef>
+          <a:fontRef idx="minor">
+            <a:schemeClr val="lt1"/>
+          </a:fontRef>
+        </p:style>
+        <p:txBody>
+          <a:bodyPr rtlCol="0" anchor="ctr"/>
+          <a:lstStyle/>
+          <a:p>
+            <a:pPr algn="ctr"/>
+            <a:endParaRPr lang="pt-BR"/>
+          </a:p>
+        </p:txBody>
+      </p:sp>
+      <p:sp>
+        <p:nvSpPr>
+          <p:cNvPr id="30" name="Elipse 29">
+            <a:extLst>
+              <a:ext uri="{FF2B5EF4-FFF2-40B4-BE49-F238E27FC236}">
+                <a16:creationId xmlns:a16="http://schemas.microsoft.com/office/drawing/2014/main" id="{74F50EDF-00D2-48F1-9EA5-19BEB2489BA2}"/>
+              </a:ext>
+            </a:extLst>
+          </p:cNvPr>
+          <p:cNvSpPr/>
+          <p:nvPr/>
+        </p:nvSpPr>
+        <p:spPr>
+          <a:xfrm>
+            <a:off x="8715788" y="2977313"/>
+            <a:ext cx="720000" cy="720000"/>
+          </a:xfrm>
+          <a:prstGeom prst="ellipse">
+            <a:avLst/>
+          </a:prstGeom>
+          <a:solidFill>
+            <a:schemeClr val="accent1">
+              <a:alpha val="15000"/>
+            </a:schemeClr>
+          </a:solidFill>
+          <a:ln>
+            <a:solidFill>
+              <a:schemeClr val="tx1"/>
+            </a:solidFill>
+          </a:ln>
+        </p:spPr>
+        <p:style>
+          <a:lnRef idx="2">
+            <a:schemeClr val="accent1">
+              <a:shade val="15000"/>
+            </a:schemeClr>
+          </a:lnRef>
+          <a:fillRef idx="1">
+            <a:schemeClr val="accent1"/>
+          </a:fillRef>
+          <a:effectRef idx="0">
+            <a:schemeClr val="accent1"/>
+          </a:effectRef>
+          <a:fontRef idx="minor">
+            <a:schemeClr val="lt1"/>
+          </a:fontRef>
+        </p:style>
+        <p:txBody>
+          <a:bodyPr rtlCol="0" anchor="ctr"/>
+          <a:lstStyle/>
+          <a:p>
+            <a:pPr algn="ctr"/>
+            <a:endParaRPr lang="pt-BR"/>
+          </a:p>
+        </p:txBody>
+      </p:sp>
+      <p:cxnSp>
+        <p:nvCxnSpPr>
+          <p:cNvPr id="31" name="Conector reto 30">
+            <a:extLst>
+              <a:ext uri="{FF2B5EF4-FFF2-40B4-BE49-F238E27FC236}">
+                <a16:creationId xmlns:a16="http://schemas.microsoft.com/office/drawing/2014/main" id="{928CB949-7A1D-7DEB-E11F-0599E4449898}"/>
+              </a:ext>
+            </a:extLst>
+          </p:cNvPr>
+          <p:cNvCxnSpPr>
+            <a:cxnSpLocks/>
+            <a:stCxn id="28" idx="3"/>
+            <a:endCxn id="29" idx="7"/>
+          </p:cNvCxnSpPr>
+          <p:nvPr/>
+        </p:nvCxnSpPr>
+        <p:spPr>
+          <a:xfrm flipH="1">
+            <a:off x="7895003" y="2800688"/>
+            <a:ext cx="206227" cy="281698"/>
+          </a:xfrm>
+          <a:prstGeom prst="line">
+            <a:avLst/>
+          </a:prstGeom>
+          <a:ln w="19050">
+            <a:solidFill>
+              <a:schemeClr val="tx1"/>
+            </a:solidFill>
+          </a:ln>
+        </p:spPr>
+        <p:style>
+          <a:lnRef idx="1">
+            <a:schemeClr val="accent1"/>
+          </a:lnRef>
+          <a:fillRef idx="0">
+            <a:schemeClr val="accent1"/>
+          </a:fillRef>
+          <a:effectRef idx="0">
+            <a:schemeClr val="accent1"/>
+          </a:effectRef>
+          <a:fontRef idx="minor">
+            <a:schemeClr val="tx1"/>
+          </a:fontRef>
+        </p:style>
+      </p:cxnSp>
+      <p:cxnSp>
+        <p:nvCxnSpPr>
+          <p:cNvPr id="32" name="Conector reto 31">
+            <a:extLst>
+              <a:ext uri="{FF2B5EF4-FFF2-40B4-BE49-F238E27FC236}">
+                <a16:creationId xmlns:a16="http://schemas.microsoft.com/office/drawing/2014/main" id="{2787ED70-8978-7F8E-5C9A-A4568576FDA5}"/>
+              </a:ext>
+            </a:extLst>
+          </p:cNvPr>
+          <p:cNvCxnSpPr>
+            <a:cxnSpLocks/>
+            <a:stCxn id="28" idx="5"/>
+            <a:endCxn id="30" idx="1"/>
+          </p:cNvCxnSpPr>
+          <p:nvPr/>
+        </p:nvCxnSpPr>
+        <p:spPr>
+          <a:xfrm>
+            <a:off x="8610346" y="2800688"/>
+            <a:ext cx="210884" cy="282067"/>
+          </a:xfrm>
+          <a:prstGeom prst="line">
+            <a:avLst/>
+          </a:prstGeom>
+          <a:ln w="19050">
+            <a:solidFill>
+              <a:schemeClr val="tx1"/>
+            </a:solidFill>
+          </a:ln>
+        </p:spPr>
+        <p:style>
+          <a:lnRef idx="1">
+            <a:schemeClr val="accent1"/>
+          </a:lnRef>
+          <a:fillRef idx="0">
+            <a:schemeClr val="accent1"/>
+          </a:fillRef>
+          <a:effectRef idx="0">
+            <a:schemeClr val="accent1"/>
+          </a:effectRef>
+          <a:fontRef idx="minor">
+            <a:schemeClr val="tx1"/>
+          </a:fontRef>
+        </p:style>
+      </p:cxnSp>
+      <p:sp>
+        <p:nvSpPr>
+          <p:cNvPr id="33" name="Elipse 32">
+            <a:extLst>
+              <a:ext uri="{FF2B5EF4-FFF2-40B4-BE49-F238E27FC236}">
+                <a16:creationId xmlns:a16="http://schemas.microsoft.com/office/drawing/2014/main" id="{E51CE2DD-65B5-036D-C274-225533916417}"/>
+              </a:ext>
+            </a:extLst>
+          </p:cNvPr>
+          <p:cNvSpPr/>
+          <p:nvPr/>
+        </p:nvSpPr>
+        <p:spPr>
+          <a:xfrm>
+            <a:off x="8360084" y="2261505"/>
+            <a:ext cx="72000" cy="72000"/>
+          </a:xfrm>
+          <a:prstGeom prst="ellipse">
+            <a:avLst/>
+          </a:prstGeom>
+          <a:solidFill>
+            <a:srgbClr val="C00000"/>
+          </a:solidFill>
+          <a:ln>
+            <a:noFill/>
+          </a:ln>
+        </p:spPr>
+        <p:style>
+          <a:lnRef idx="2">
+            <a:schemeClr val="accent1">
+              <a:shade val="15000"/>
+            </a:schemeClr>
+          </a:lnRef>
+          <a:fillRef idx="1">
+            <a:schemeClr val="accent1"/>
+          </a:fillRef>
+          <a:effectRef idx="0">
+            <a:schemeClr val="accent1"/>
+          </a:effectRef>
+          <a:fontRef idx="minor">
+            <a:schemeClr val="lt1"/>
+          </a:fontRef>
+        </p:style>
+        <p:txBody>
+          <a:bodyPr rtlCol="0" anchor="ctr"/>
+          <a:lstStyle/>
+          <a:p>
+            <a:pPr algn="ctr"/>
+            <a:endParaRPr lang="pt-BR"/>
+          </a:p>
+        </p:txBody>
+      </p:sp>
+      <p:sp>
+        <p:nvSpPr>
+          <p:cNvPr id="34" name="Elipse 33">
+            <a:extLst>
+              <a:ext uri="{FF2B5EF4-FFF2-40B4-BE49-F238E27FC236}">
+                <a16:creationId xmlns:a16="http://schemas.microsoft.com/office/drawing/2014/main" id="{CD19E509-6BEA-B21E-FFBA-26071DB94893}"/>
+              </a:ext>
+            </a:extLst>
+          </p:cNvPr>
+          <p:cNvSpPr/>
+          <p:nvPr/>
+        </p:nvSpPr>
+        <p:spPr>
+          <a:xfrm>
+            <a:off x="8508264" y="2621305"/>
+            <a:ext cx="72000" cy="72000"/>
+          </a:xfrm>
+          <a:prstGeom prst="ellipse">
+            <a:avLst/>
+          </a:prstGeom>
+          <a:solidFill>
+            <a:srgbClr val="C00000"/>
+          </a:solidFill>
+          <a:ln>
+            <a:noFill/>
+          </a:ln>
+        </p:spPr>
+        <p:style>
+          <a:lnRef idx="2">
+            <a:schemeClr val="accent1">
+              <a:shade val="15000"/>
+            </a:schemeClr>
+          </a:lnRef>
+          <a:fillRef idx="1">
+            <a:schemeClr val="accent1"/>
+          </a:fillRef>
+          <a:effectRef idx="0">
+            <a:schemeClr val="accent1"/>
+          </a:effectRef>
+          <a:fontRef idx="minor">
+            <a:schemeClr val="lt1"/>
+          </a:fontRef>
+        </p:style>
+        <p:txBody>
+          <a:bodyPr rtlCol="0" anchor="ctr"/>
+          <a:lstStyle/>
+          <a:p>
+            <a:pPr algn="ctr"/>
+            <a:endParaRPr lang="pt-BR"/>
+          </a:p>
+        </p:txBody>
+      </p:sp>
+      <p:sp>
+        <p:nvSpPr>
+          <p:cNvPr id="35" name="Elipse 34">
+            <a:extLst>
+              <a:ext uri="{FF2B5EF4-FFF2-40B4-BE49-F238E27FC236}">
+                <a16:creationId xmlns:a16="http://schemas.microsoft.com/office/drawing/2014/main" id="{ABD308EC-B4EA-AF9E-97FF-5A93165C06D4}"/>
+              </a:ext>
+            </a:extLst>
+          </p:cNvPr>
+          <p:cNvSpPr/>
+          <p:nvPr/>
+        </p:nvSpPr>
+        <p:spPr>
+          <a:xfrm>
+            <a:off x="7698412" y="3085691"/>
+            <a:ext cx="72000" cy="72000"/>
+          </a:xfrm>
+          <a:prstGeom prst="ellipse">
+            <a:avLst/>
+          </a:prstGeom>
+          <a:solidFill>
+            <a:srgbClr val="C00000"/>
+          </a:solidFill>
+          <a:ln>
+            <a:noFill/>
+          </a:ln>
+        </p:spPr>
+        <p:style>
+          <a:lnRef idx="2">
+            <a:schemeClr val="accent1">
+              <a:shade val="15000"/>
+            </a:schemeClr>
+          </a:lnRef>
+          <a:fillRef idx="1">
+            <a:schemeClr val="accent1"/>
+          </a:fillRef>
+          <a:effectRef idx="0">
+            <a:schemeClr val="accent1"/>
+          </a:effectRef>
+          <a:fontRef idx="minor">
+            <a:schemeClr val="lt1"/>
+          </a:fontRef>
+        </p:style>
+        <p:txBody>
+          <a:bodyPr rtlCol="0" anchor="ctr"/>
+          <a:lstStyle/>
+          <a:p>
+            <a:pPr algn="ctr"/>
+            <a:endParaRPr lang="pt-BR"/>
+          </a:p>
+        </p:txBody>
+      </p:sp>
+      <p:sp>
+        <p:nvSpPr>
+          <p:cNvPr id="36" name="Elipse 35">
+            <a:extLst>
+              <a:ext uri="{FF2B5EF4-FFF2-40B4-BE49-F238E27FC236}">
+                <a16:creationId xmlns:a16="http://schemas.microsoft.com/office/drawing/2014/main" id="{64DA90CE-DB59-D5B5-0D93-0D8D8D99E7C0}"/>
+              </a:ext>
+            </a:extLst>
+          </p:cNvPr>
+          <p:cNvSpPr/>
+          <p:nvPr/>
+        </p:nvSpPr>
+        <p:spPr>
+          <a:xfrm>
+            <a:off x="8156492" y="2514599"/>
+            <a:ext cx="72000" cy="72000"/>
+          </a:xfrm>
+          <a:prstGeom prst="ellipse">
+            <a:avLst/>
+          </a:prstGeom>
+          <a:solidFill>
+            <a:srgbClr val="C00000"/>
+          </a:solidFill>
+          <a:ln>
+            <a:noFill/>
+          </a:ln>
+        </p:spPr>
+        <p:style>
+          <a:lnRef idx="2">
+            <a:schemeClr val="accent1">
+              <a:shade val="15000"/>
+            </a:schemeClr>
+          </a:lnRef>
+          <a:fillRef idx="1">
+            <a:schemeClr val="accent1"/>
+          </a:fillRef>
+          <a:effectRef idx="0">
+            <a:schemeClr val="accent1"/>
+          </a:effectRef>
+          <a:fontRef idx="minor">
+            <a:schemeClr val="lt1"/>
+          </a:fontRef>
+        </p:style>
+        <p:txBody>
+          <a:bodyPr rtlCol="0" anchor="ctr"/>
+          <a:lstStyle/>
+          <a:p>
+            <a:pPr algn="ctr"/>
+            <a:endParaRPr lang="pt-BR"/>
+          </a:p>
+        </p:txBody>
+      </p:sp>
+      <p:sp>
+        <p:nvSpPr>
+          <p:cNvPr id="37" name="Elipse 36">
+            <a:extLst>
+              <a:ext uri="{FF2B5EF4-FFF2-40B4-BE49-F238E27FC236}">
+                <a16:creationId xmlns:a16="http://schemas.microsoft.com/office/drawing/2014/main" id="{00FD076A-EA52-C678-63F6-039C74825668}"/>
+              </a:ext>
+            </a:extLst>
+          </p:cNvPr>
+          <p:cNvSpPr/>
+          <p:nvPr/>
+        </p:nvSpPr>
+        <p:spPr>
+          <a:xfrm>
+            <a:off x="8156492" y="2326199"/>
+            <a:ext cx="72000" cy="72000"/>
+          </a:xfrm>
+          <a:prstGeom prst="ellipse">
+            <a:avLst/>
+          </a:prstGeom>
+          <a:solidFill>
+            <a:schemeClr val="accent1"/>
+          </a:solidFill>
+          <a:ln>
+            <a:noFill/>
+          </a:ln>
+        </p:spPr>
+        <p:style>
+          <a:lnRef idx="2">
+            <a:schemeClr val="accent1">
+              <a:shade val="15000"/>
+            </a:schemeClr>
+          </a:lnRef>
+          <a:fillRef idx="1">
+            <a:schemeClr val="accent1"/>
+          </a:fillRef>
+          <a:effectRef idx="0">
+            <a:schemeClr val="accent1"/>
+          </a:effectRef>
+          <a:fontRef idx="minor">
+            <a:schemeClr val="lt1"/>
+          </a:fontRef>
+        </p:style>
+        <p:txBody>
+          <a:bodyPr rtlCol="0" anchor="ctr"/>
+          <a:lstStyle/>
+          <a:p>
+            <a:pPr algn="ctr"/>
+            <a:endParaRPr lang="pt-BR"/>
+          </a:p>
+        </p:txBody>
+      </p:sp>
+      <p:sp>
+        <p:nvSpPr>
+          <p:cNvPr id="38" name="Elipse 37">
+            <a:extLst>
+              <a:ext uri="{FF2B5EF4-FFF2-40B4-BE49-F238E27FC236}">
+                <a16:creationId xmlns:a16="http://schemas.microsoft.com/office/drawing/2014/main" id="{991C7B34-CEC6-D093-4E6F-ED50BDF27831}"/>
+              </a:ext>
+            </a:extLst>
+          </p:cNvPr>
+          <p:cNvSpPr/>
+          <p:nvPr/>
+        </p:nvSpPr>
+        <p:spPr>
+          <a:xfrm>
+            <a:off x="8515324" y="2398199"/>
+            <a:ext cx="72000" cy="72000"/>
+          </a:xfrm>
+          <a:prstGeom prst="ellipse">
+            <a:avLst/>
+          </a:prstGeom>
+          <a:solidFill>
+            <a:schemeClr val="accent1"/>
+          </a:solidFill>
+          <a:ln>
+            <a:noFill/>
+          </a:ln>
+        </p:spPr>
+        <p:style>
+          <a:lnRef idx="2">
+            <a:schemeClr val="accent1">
+              <a:shade val="15000"/>
+            </a:schemeClr>
+          </a:lnRef>
+          <a:fillRef idx="1">
+            <a:schemeClr val="accent1"/>
+          </a:fillRef>
+          <a:effectRef idx="0">
+            <a:schemeClr val="accent1"/>
+          </a:effectRef>
+          <a:fontRef idx="minor">
+            <a:schemeClr val="lt1"/>
+          </a:fontRef>
+        </p:style>
+        <p:txBody>
+          <a:bodyPr rtlCol="0" anchor="ctr"/>
+          <a:lstStyle/>
+          <a:p>
+            <a:pPr algn="ctr"/>
+            <a:endParaRPr lang="pt-BR"/>
+          </a:p>
+        </p:txBody>
+      </p:sp>
+      <p:sp>
+        <p:nvSpPr>
+          <p:cNvPr id="39" name="Elipse 38">
+            <a:extLst>
+              <a:ext uri="{FF2B5EF4-FFF2-40B4-BE49-F238E27FC236}">
+                <a16:creationId xmlns:a16="http://schemas.microsoft.com/office/drawing/2014/main" id="{3B4C3F78-2F47-79B9-A402-73EE6E9020D9}"/>
+              </a:ext>
+            </a:extLst>
+          </p:cNvPr>
+          <p:cNvSpPr/>
+          <p:nvPr/>
+        </p:nvSpPr>
+        <p:spPr>
+          <a:xfrm>
+            <a:off x="8151458" y="2692687"/>
+            <a:ext cx="72000" cy="72000"/>
+          </a:xfrm>
+          <a:prstGeom prst="ellipse">
+            <a:avLst/>
+          </a:prstGeom>
+          <a:solidFill>
+            <a:schemeClr val="accent1"/>
+          </a:solidFill>
+          <a:ln>
+            <a:noFill/>
+          </a:ln>
+        </p:spPr>
+        <p:style>
+          <a:lnRef idx="2">
+            <a:schemeClr val="accent1">
+              <a:shade val="15000"/>
+            </a:schemeClr>
+          </a:lnRef>
+          <a:fillRef idx="1">
+            <a:schemeClr val="accent1"/>
+          </a:fillRef>
+          <a:effectRef idx="0">
+            <a:schemeClr val="accent1"/>
+          </a:effectRef>
+          <a:fontRef idx="minor">
+            <a:schemeClr val="lt1"/>
+          </a:fontRef>
+        </p:style>
+        <p:txBody>
+          <a:bodyPr rtlCol="0" anchor="ctr"/>
+          <a:lstStyle/>
+          <a:p>
+            <a:pPr algn="ctr"/>
+            <a:endParaRPr lang="pt-BR"/>
+          </a:p>
+        </p:txBody>
+      </p:sp>
+      <p:sp>
+        <p:nvSpPr>
+          <p:cNvPr id="40" name="Elipse 39">
+            <a:extLst>
+              <a:ext uri="{FF2B5EF4-FFF2-40B4-BE49-F238E27FC236}">
+                <a16:creationId xmlns:a16="http://schemas.microsoft.com/office/drawing/2014/main" id="{B9A47CF5-8B57-3926-20F3-5BF4E0056DFC}"/>
+              </a:ext>
+            </a:extLst>
+          </p:cNvPr>
+          <p:cNvSpPr/>
+          <p:nvPr/>
+        </p:nvSpPr>
+        <p:spPr>
+          <a:xfrm>
+            <a:off x="8335908" y="2470199"/>
+            <a:ext cx="72000" cy="72000"/>
+          </a:xfrm>
+          <a:prstGeom prst="ellipse">
+            <a:avLst/>
+          </a:prstGeom>
+          <a:solidFill>
+            <a:schemeClr val="accent1"/>
+          </a:solidFill>
+          <a:ln>
+            <a:noFill/>
+          </a:ln>
+        </p:spPr>
+        <p:style>
+          <a:lnRef idx="2">
+            <a:schemeClr val="accent1">
+              <a:shade val="15000"/>
+            </a:schemeClr>
+          </a:lnRef>
+          <a:fillRef idx="1">
+            <a:schemeClr val="accent1"/>
+          </a:fillRef>
+          <a:effectRef idx="0">
+            <a:schemeClr val="accent1"/>
+          </a:effectRef>
+          <a:fontRef idx="minor">
+            <a:schemeClr val="lt1"/>
+          </a:fontRef>
+        </p:style>
+        <p:txBody>
+          <a:bodyPr rtlCol="0" anchor="ctr"/>
+          <a:lstStyle/>
+          <a:p>
+            <a:pPr algn="ctr"/>
+            <a:endParaRPr lang="pt-BR"/>
+          </a:p>
+        </p:txBody>
+      </p:sp>
+      <p:sp>
+        <p:nvSpPr>
+          <p:cNvPr id="45" name="Elipse 44">
+            <a:extLst>
+              <a:ext uri="{FF2B5EF4-FFF2-40B4-BE49-F238E27FC236}">
+                <a16:creationId xmlns:a16="http://schemas.microsoft.com/office/drawing/2014/main" id="{CF9787F6-D7E2-33EB-1180-6F5982B30B2E}"/>
+              </a:ext>
+            </a:extLst>
+          </p:cNvPr>
+          <p:cNvSpPr/>
+          <p:nvPr/>
+        </p:nvSpPr>
+        <p:spPr>
+          <a:xfrm>
+            <a:off x="4933762" y="3211063"/>
+            <a:ext cx="72000" cy="72000"/>
+          </a:xfrm>
+          <a:prstGeom prst="ellipse">
+            <a:avLst/>
+          </a:prstGeom>
+          <a:solidFill>
+            <a:srgbClr val="C00000"/>
+          </a:solidFill>
+          <a:ln>
+            <a:noFill/>
+          </a:ln>
+        </p:spPr>
+        <p:style>
+          <a:lnRef idx="2">
+            <a:schemeClr val="accent1">
+              <a:shade val="15000"/>
+            </a:schemeClr>
+          </a:lnRef>
+          <a:fillRef idx="1">
+            <a:schemeClr val="accent1"/>
+          </a:fillRef>
+          <a:effectRef idx="0">
+            <a:schemeClr val="accent1"/>
+          </a:effectRef>
+          <a:fontRef idx="minor">
+            <a:schemeClr val="lt1"/>
+          </a:fontRef>
+        </p:style>
+        <p:txBody>
+          <a:bodyPr rtlCol="0" anchor="ctr"/>
+          <a:lstStyle/>
+          <a:p>
+            <a:pPr algn="ctr"/>
+            <a:endParaRPr lang="pt-BR"/>
+          </a:p>
+        </p:txBody>
+      </p:sp>
+      <p:sp>
+        <p:nvSpPr>
+          <p:cNvPr id="46" name="Elipse 45">
+            <a:extLst>
+              <a:ext uri="{FF2B5EF4-FFF2-40B4-BE49-F238E27FC236}">
+                <a16:creationId xmlns:a16="http://schemas.microsoft.com/office/drawing/2014/main" id="{32230791-E010-21D6-F05D-178263B5801A}"/>
+              </a:ext>
+            </a:extLst>
+          </p:cNvPr>
+          <p:cNvSpPr/>
+          <p:nvPr/>
+        </p:nvSpPr>
+        <p:spPr>
+          <a:xfrm>
+            <a:off x="5184366" y="3104014"/>
+            <a:ext cx="72000" cy="72000"/>
+          </a:xfrm>
+          <a:prstGeom prst="ellipse">
+            <a:avLst/>
+          </a:prstGeom>
+          <a:solidFill>
+            <a:srgbClr val="C00000"/>
+          </a:solidFill>
+          <a:ln>
+            <a:noFill/>
+          </a:ln>
+        </p:spPr>
+        <p:style>
+          <a:lnRef idx="2">
+            <a:schemeClr val="accent1">
+              <a:shade val="15000"/>
+            </a:schemeClr>
+          </a:lnRef>
+          <a:fillRef idx="1">
+            <a:schemeClr val="accent1"/>
+          </a:fillRef>
+          <a:effectRef idx="0">
+            <a:schemeClr val="accent1"/>
+          </a:effectRef>
+          <a:fontRef idx="minor">
+            <a:schemeClr val="lt1"/>
+          </a:fontRef>
+        </p:style>
+        <p:txBody>
+          <a:bodyPr rtlCol="0" anchor="ctr"/>
+          <a:lstStyle/>
+          <a:p>
+            <a:pPr algn="ctr"/>
+            <a:endParaRPr lang="pt-BR"/>
+          </a:p>
+        </p:txBody>
+      </p:sp>
+      <p:sp>
+        <p:nvSpPr>
+          <p:cNvPr id="47" name="Elipse 46">
+            <a:extLst>
+              <a:ext uri="{FF2B5EF4-FFF2-40B4-BE49-F238E27FC236}">
+                <a16:creationId xmlns:a16="http://schemas.microsoft.com/office/drawing/2014/main" id="{DE9E3B51-147D-07B7-1FB0-649E2B8D1269}"/>
+              </a:ext>
+            </a:extLst>
+          </p:cNvPr>
+          <p:cNvSpPr/>
+          <p:nvPr/>
+        </p:nvSpPr>
+        <p:spPr>
+          <a:xfrm>
+            <a:off x="5112366" y="3525366"/>
+            <a:ext cx="72000" cy="72000"/>
+          </a:xfrm>
+          <a:prstGeom prst="ellipse">
+            <a:avLst/>
+          </a:prstGeom>
+          <a:solidFill>
+            <a:srgbClr val="C00000"/>
+          </a:solidFill>
+          <a:ln>
+            <a:noFill/>
+          </a:ln>
+        </p:spPr>
+        <p:style>
+          <a:lnRef idx="2">
+            <a:schemeClr val="accent1">
+              <a:shade val="15000"/>
+            </a:schemeClr>
+          </a:lnRef>
+          <a:fillRef idx="1">
+            <a:schemeClr val="accent1"/>
+          </a:fillRef>
+          <a:effectRef idx="0">
+            <a:schemeClr val="accent1"/>
+          </a:effectRef>
+          <a:fontRef idx="minor">
+            <a:schemeClr val="lt1"/>
+          </a:fontRef>
+        </p:style>
+        <p:txBody>
+          <a:bodyPr rtlCol="0" anchor="ctr"/>
+          <a:lstStyle/>
+          <a:p>
+            <a:pPr algn="ctr"/>
+            <a:endParaRPr lang="pt-BR"/>
+          </a:p>
+        </p:txBody>
+      </p:sp>
+      <p:sp>
+        <p:nvSpPr>
+          <p:cNvPr id="48" name="Elipse 47">
+            <a:extLst>
+              <a:ext uri="{FF2B5EF4-FFF2-40B4-BE49-F238E27FC236}">
+                <a16:creationId xmlns:a16="http://schemas.microsoft.com/office/drawing/2014/main" id="{D875CBEB-D596-278A-8C40-B8C37E882418}"/>
+              </a:ext>
+            </a:extLst>
+          </p:cNvPr>
+          <p:cNvSpPr/>
+          <p:nvPr/>
+        </p:nvSpPr>
+        <p:spPr>
+          <a:xfrm>
+            <a:off x="5138356" y="3308677"/>
+            <a:ext cx="72000" cy="72000"/>
+          </a:xfrm>
+          <a:prstGeom prst="ellipse">
+            <a:avLst/>
+          </a:prstGeom>
+          <a:solidFill>
+            <a:schemeClr val="accent1"/>
+          </a:solidFill>
+          <a:ln>
+            <a:noFill/>
+          </a:ln>
+        </p:spPr>
+        <p:style>
+          <a:lnRef idx="2">
+            <a:schemeClr val="accent1">
+              <a:shade val="15000"/>
+            </a:schemeClr>
+          </a:lnRef>
+          <a:fillRef idx="1">
+            <a:schemeClr val="accent1"/>
+          </a:fillRef>
+          <a:effectRef idx="0">
+            <a:schemeClr val="accent1"/>
+          </a:effectRef>
+          <a:fontRef idx="minor">
+            <a:schemeClr val="lt1"/>
+          </a:fontRef>
+        </p:style>
+        <p:txBody>
+          <a:bodyPr rtlCol="0" anchor="ctr"/>
+          <a:lstStyle/>
+          <a:p>
+            <a:pPr algn="ctr"/>
+            <a:endParaRPr lang="pt-BR"/>
+          </a:p>
+        </p:txBody>
+      </p:sp>
+      <p:sp>
+        <p:nvSpPr>
+          <p:cNvPr id="49" name="Elipse 48">
+            <a:extLst>
+              <a:ext uri="{FF2B5EF4-FFF2-40B4-BE49-F238E27FC236}">
+                <a16:creationId xmlns:a16="http://schemas.microsoft.com/office/drawing/2014/main" id="{94C3E635-2787-825D-0AD0-3D00B3755779}"/>
+              </a:ext>
+            </a:extLst>
+          </p:cNvPr>
+          <p:cNvSpPr/>
+          <p:nvPr/>
+        </p:nvSpPr>
+        <p:spPr>
+          <a:xfrm>
+            <a:off x="6311947" y="3294982"/>
+            <a:ext cx="72000" cy="72000"/>
+          </a:xfrm>
+          <a:prstGeom prst="ellipse">
+            <a:avLst/>
+          </a:prstGeom>
+          <a:solidFill>
+            <a:schemeClr val="accent1"/>
+          </a:solidFill>
+          <a:ln>
+            <a:noFill/>
+          </a:ln>
+        </p:spPr>
+        <p:style>
+          <a:lnRef idx="2">
+            <a:schemeClr val="accent1">
+              <a:shade val="15000"/>
+            </a:schemeClr>
+          </a:lnRef>
+          <a:fillRef idx="1">
+            <a:schemeClr val="accent1"/>
+          </a:fillRef>
+          <a:effectRef idx="0">
+            <a:schemeClr val="accent1"/>
+          </a:effectRef>
+          <a:fontRef idx="minor">
+            <a:schemeClr val="lt1"/>
+          </a:fontRef>
+        </p:style>
+        <p:txBody>
+          <a:bodyPr rtlCol="0" anchor="ctr"/>
+          <a:lstStyle/>
+          <a:p>
+            <a:pPr algn="ctr"/>
+            <a:endParaRPr lang="pt-BR"/>
+          </a:p>
+        </p:txBody>
+      </p:sp>
+      <p:sp>
+        <p:nvSpPr>
+          <p:cNvPr id="50" name="Elipse 49">
+            <a:extLst>
+              <a:ext uri="{FF2B5EF4-FFF2-40B4-BE49-F238E27FC236}">
+                <a16:creationId xmlns:a16="http://schemas.microsoft.com/office/drawing/2014/main" id="{630EAB11-1BAC-258B-E81F-5DC64226D7A9}"/>
+              </a:ext>
+            </a:extLst>
+          </p:cNvPr>
+          <p:cNvSpPr/>
+          <p:nvPr/>
+        </p:nvSpPr>
+        <p:spPr>
+          <a:xfrm>
+            <a:off x="6511758" y="3489366"/>
+            <a:ext cx="72000" cy="72000"/>
+          </a:xfrm>
+          <a:prstGeom prst="ellipse">
+            <a:avLst/>
+          </a:prstGeom>
+          <a:solidFill>
+            <a:schemeClr val="accent1"/>
+          </a:solidFill>
+          <a:ln>
+            <a:noFill/>
+          </a:ln>
+        </p:spPr>
+        <p:style>
+          <a:lnRef idx="2">
+            <a:schemeClr val="accent1">
+              <a:shade val="15000"/>
+            </a:schemeClr>
+          </a:lnRef>
+          <a:fillRef idx="1">
+            <a:schemeClr val="accent1"/>
+          </a:fillRef>
+          <a:effectRef idx="0">
+            <a:schemeClr val="accent1"/>
+          </a:effectRef>
+          <a:fontRef idx="minor">
+            <a:schemeClr val="lt1"/>
+          </a:fontRef>
+        </p:style>
+        <p:txBody>
+          <a:bodyPr rtlCol="0" anchor="ctr"/>
+          <a:lstStyle/>
+          <a:p>
+            <a:pPr algn="ctr"/>
+            <a:endParaRPr lang="pt-BR"/>
+          </a:p>
+        </p:txBody>
+      </p:sp>
+      <p:sp>
+        <p:nvSpPr>
+          <p:cNvPr id="51" name="Elipse 50">
+            <a:extLst>
+              <a:ext uri="{FF2B5EF4-FFF2-40B4-BE49-F238E27FC236}">
+                <a16:creationId xmlns:a16="http://schemas.microsoft.com/office/drawing/2014/main" id="{37367F80-E9A1-B948-7647-E2F9FF958D49}"/>
+              </a:ext>
+            </a:extLst>
+          </p:cNvPr>
+          <p:cNvSpPr/>
+          <p:nvPr/>
+        </p:nvSpPr>
+        <p:spPr>
+          <a:xfrm>
+            <a:off x="6626907" y="3139063"/>
+            <a:ext cx="72000" cy="72000"/>
+          </a:xfrm>
+          <a:prstGeom prst="ellipse">
+            <a:avLst/>
+          </a:prstGeom>
+          <a:solidFill>
+            <a:schemeClr val="accent1"/>
+          </a:solidFill>
+          <a:ln>
+            <a:noFill/>
+          </a:ln>
+        </p:spPr>
+        <p:style>
+          <a:lnRef idx="2">
+            <a:schemeClr val="accent1">
+              <a:shade val="15000"/>
+            </a:schemeClr>
+          </a:lnRef>
+          <a:fillRef idx="1">
+            <a:schemeClr val="accent1"/>
+          </a:fillRef>
+          <a:effectRef idx="0">
+            <a:schemeClr val="accent1"/>
+          </a:effectRef>
+          <a:fontRef idx="minor">
+            <a:schemeClr val="lt1"/>
+          </a:fontRef>
+        </p:style>
+        <p:txBody>
+          <a:bodyPr rtlCol="0" anchor="ctr"/>
+          <a:lstStyle/>
+          <a:p>
+            <a:pPr algn="ctr"/>
+            <a:endParaRPr lang="pt-BR"/>
+          </a:p>
+        </p:txBody>
+      </p:sp>
+      <p:sp>
+        <p:nvSpPr>
+          <p:cNvPr id="52" name="Elipse 51">
+            <a:extLst>
+              <a:ext uri="{FF2B5EF4-FFF2-40B4-BE49-F238E27FC236}">
+                <a16:creationId xmlns:a16="http://schemas.microsoft.com/office/drawing/2014/main" id="{A06F3CEB-0F2A-3167-B349-69DD29010233}"/>
+              </a:ext>
+            </a:extLst>
+          </p:cNvPr>
+          <p:cNvSpPr/>
+          <p:nvPr/>
+        </p:nvSpPr>
+        <p:spPr>
+          <a:xfrm>
+            <a:off x="6428872" y="3099183"/>
+            <a:ext cx="72000" cy="72000"/>
+          </a:xfrm>
+          <a:prstGeom prst="ellipse">
+            <a:avLst/>
+          </a:prstGeom>
+          <a:solidFill>
+            <a:srgbClr val="C00000"/>
+          </a:solidFill>
+          <a:ln>
+            <a:noFill/>
+          </a:ln>
+        </p:spPr>
+        <p:style>
+          <a:lnRef idx="2">
+            <a:schemeClr val="accent1">
+              <a:shade val="15000"/>
+            </a:schemeClr>
+          </a:lnRef>
+          <a:fillRef idx="1">
+            <a:schemeClr val="accent1"/>
+          </a:fillRef>
+          <a:effectRef idx="0">
+            <a:schemeClr val="accent1"/>
+          </a:effectRef>
+          <a:fontRef idx="minor">
+            <a:schemeClr val="lt1"/>
+          </a:fontRef>
+        </p:style>
+        <p:txBody>
+          <a:bodyPr rtlCol="0" anchor="ctr"/>
+          <a:lstStyle/>
+          <a:p>
+            <a:pPr algn="ctr"/>
+            <a:endParaRPr lang="pt-BR"/>
+          </a:p>
+        </p:txBody>
+      </p:sp>
+      <p:sp>
+        <p:nvSpPr>
+          <p:cNvPr id="53" name="Elipse 52">
+            <a:extLst>
+              <a:ext uri="{FF2B5EF4-FFF2-40B4-BE49-F238E27FC236}">
+                <a16:creationId xmlns:a16="http://schemas.microsoft.com/office/drawing/2014/main" id="{06A490D2-06E1-336E-D72C-23EC2F2AA865}"/>
+              </a:ext>
+            </a:extLst>
+          </p:cNvPr>
+          <p:cNvSpPr/>
+          <p:nvPr/>
+        </p:nvSpPr>
+        <p:spPr>
+          <a:xfrm>
+            <a:off x="7565133" y="3181025"/>
+            <a:ext cx="72000" cy="72000"/>
+          </a:xfrm>
+          <a:prstGeom prst="ellipse">
+            <a:avLst/>
+          </a:prstGeom>
+          <a:solidFill>
+            <a:schemeClr val="accent1"/>
+          </a:solidFill>
+          <a:ln>
+            <a:noFill/>
+          </a:ln>
+        </p:spPr>
+        <p:style>
+          <a:lnRef idx="2">
+            <a:schemeClr val="accent1">
+              <a:shade val="15000"/>
+            </a:schemeClr>
+          </a:lnRef>
+          <a:fillRef idx="1">
+            <a:schemeClr val="accent1"/>
+          </a:fillRef>
+          <a:effectRef idx="0">
+            <a:schemeClr val="accent1"/>
+          </a:effectRef>
+          <a:fontRef idx="minor">
+            <a:schemeClr val="lt1"/>
+          </a:fontRef>
+        </p:style>
+        <p:txBody>
+          <a:bodyPr rtlCol="0" anchor="ctr"/>
+          <a:lstStyle/>
+          <a:p>
+            <a:pPr algn="ctr"/>
+            <a:endParaRPr lang="pt-BR"/>
+          </a:p>
+        </p:txBody>
+      </p:sp>
+      <p:sp>
+        <p:nvSpPr>
+          <p:cNvPr id="54" name="Elipse 53">
+            <a:extLst>
+              <a:ext uri="{FF2B5EF4-FFF2-40B4-BE49-F238E27FC236}">
+                <a16:creationId xmlns:a16="http://schemas.microsoft.com/office/drawing/2014/main" id="{563987AF-451C-1DDD-16D8-159A16971CC1}"/>
+              </a:ext>
+            </a:extLst>
+          </p:cNvPr>
+          <p:cNvSpPr/>
+          <p:nvPr/>
+        </p:nvSpPr>
+        <p:spPr>
+          <a:xfrm>
+            <a:off x="7770412" y="3429000"/>
+            <a:ext cx="72000" cy="72000"/>
+          </a:xfrm>
+          <a:prstGeom prst="ellipse">
+            <a:avLst/>
+          </a:prstGeom>
+          <a:solidFill>
+            <a:schemeClr val="accent1"/>
+          </a:solidFill>
+          <a:ln>
+            <a:noFill/>
+          </a:ln>
+        </p:spPr>
+        <p:style>
+          <a:lnRef idx="2">
+            <a:schemeClr val="accent1">
+              <a:shade val="15000"/>
+            </a:schemeClr>
+          </a:lnRef>
+          <a:fillRef idx="1">
+            <a:schemeClr val="accent1"/>
+          </a:fillRef>
+          <a:effectRef idx="0">
+            <a:schemeClr val="accent1"/>
+          </a:effectRef>
+          <a:fontRef idx="minor">
+            <a:schemeClr val="lt1"/>
+          </a:fontRef>
+        </p:style>
+        <p:txBody>
+          <a:bodyPr rtlCol="0" anchor="ctr"/>
+          <a:lstStyle/>
+          <a:p>
+            <a:pPr algn="ctr"/>
+            <a:endParaRPr lang="pt-BR"/>
+          </a:p>
+        </p:txBody>
+      </p:sp>
+      <p:sp>
+        <p:nvSpPr>
+          <p:cNvPr id="55" name="Elipse 54">
+            <a:extLst>
+              <a:ext uri="{FF2B5EF4-FFF2-40B4-BE49-F238E27FC236}">
+                <a16:creationId xmlns:a16="http://schemas.microsoft.com/office/drawing/2014/main" id="{99C0BCE1-3F4D-68C4-FEF4-97E29217BB23}"/>
+              </a:ext>
+            </a:extLst>
+          </p:cNvPr>
+          <p:cNvSpPr/>
+          <p:nvPr/>
+        </p:nvSpPr>
+        <p:spPr>
+          <a:xfrm>
+            <a:off x="8308892" y="2666999"/>
+            <a:ext cx="72000" cy="72000"/>
+          </a:xfrm>
+          <a:prstGeom prst="ellipse">
+            <a:avLst/>
+          </a:prstGeom>
+          <a:solidFill>
+            <a:srgbClr val="C00000"/>
+          </a:solidFill>
+          <a:ln>
+            <a:noFill/>
+          </a:ln>
+        </p:spPr>
+        <p:style>
+          <a:lnRef idx="2">
+            <a:schemeClr val="accent1">
+              <a:shade val="15000"/>
+            </a:schemeClr>
+          </a:lnRef>
+          <a:fillRef idx="1">
+            <a:schemeClr val="accent1"/>
+          </a:fillRef>
+          <a:effectRef idx="0">
+            <a:schemeClr val="accent1"/>
+          </a:effectRef>
+          <a:fontRef idx="minor">
+            <a:schemeClr val="lt1"/>
+          </a:fontRef>
+        </p:style>
+        <p:txBody>
+          <a:bodyPr rtlCol="0" anchor="ctr"/>
+          <a:lstStyle/>
+          <a:p>
+            <a:pPr algn="ctr"/>
+            <a:endParaRPr lang="pt-BR"/>
+          </a:p>
+        </p:txBody>
+      </p:sp>
+      <p:sp>
+        <p:nvSpPr>
+          <p:cNvPr id="56" name="Elipse 55">
+            <a:extLst>
+              <a:ext uri="{FF2B5EF4-FFF2-40B4-BE49-F238E27FC236}">
+                <a16:creationId xmlns:a16="http://schemas.microsoft.com/office/drawing/2014/main" id="{49F2B7B0-7595-A893-02BA-E80A51CF322C}"/>
+              </a:ext>
+            </a:extLst>
+          </p:cNvPr>
+          <p:cNvSpPr/>
+          <p:nvPr/>
+        </p:nvSpPr>
+        <p:spPr>
+          <a:xfrm>
+            <a:off x="7823003" y="3285703"/>
+            <a:ext cx="72000" cy="72000"/>
+          </a:xfrm>
+          <a:prstGeom prst="ellipse">
+            <a:avLst/>
+          </a:prstGeom>
+          <a:solidFill>
+            <a:srgbClr val="C00000"/>
+          </a:solidFill>
+          <a:ln>
+            <a:noFill/>
+          </a:ln>
+        </p:spPr>
+        <p:style>
+          <a:lnRef idx="2">
+            <a:schemeClr val="accent1">
+              <a:shade val="15000"/>
+            </a:schemeClr>
+          </a:lnRef>
+          <a:fillRef idx="1">
+            <a:schemeClr val="accent1"/>
+          </a:fillRef>
+          <a:effectRef idx="0">
+            <a:schemeClr val="accent1"/>
+          </a:effectRef>
+          <a:fontRef idx="minor">
+            <a:schemeClr val="lt1"/>
+          </a:fontRef>
+        </p:style>
+        <p:txBody>
+          <a:bodyPr rtlCol="0" anchor="ctr"/>
+          <a:lstStyle/>
+          <a:p>
+            <a:pPr algn="ctr"/>
+            <a:endParaRPr lang="pt-BR"/>
+          </a:p>
+        </p:txBody>
+      </p:sp>
+      <p:sp>
+        <p:nvSpPr>
+          <p:cNvPr id="57" name="Elipse 56">
+            <a:extLst>
+              <a:ext uri="{FF2B5EF4-FFF2-40B4-BE49-F238E27FC236}">
+                <a16:creationId xmlns:a16="http://schemas.microsoft.com/office/drawing/2014/main" id="{83239D9E-A19C-1B19-CA3A-CC60CA80E147}"/>
+              </a:ext>
+            </a:extLst>
+          </p:cNvPr>
+          <p:cNvSpPr/>
+          <p:nvPr/>
+        </p:nvSpPr>
+        <p:spPr>
+          <a:xfrm>
+            <a:off x="7390510" y="3300944"/>
+            <a:ext cx="72000" cy="72000"/>
+          </a:xfrm>
+          <a:prstGeom prst="ellipse">
+            <a:avLst/>
+          </a:prstGeom>
+          <a:solidFill>
+            <a:srgbClr val="C00000"/>
+          </a:solidFill>
+          <a:ln>
+            <a:noFill/>
+          </a:ln>
+        </p:spPr>
+        <p:style>
+          <a:lnRef idx="2">
+            <a:schemeClr val="accent1">
+              <a:shade val="15000"/>
+            </a:schemeClr>
+          </a:lnRef>
+          <a:fillRef idx="1">
+            <a:schemeClr val="accent1"/>
+          </a:fillRef>
+          <a:effectRef idx="0">
+            <a:schemeClr val="accent1"/>
+          </a:effectRef>
+          <a:fontRef idx="minor">
+            <a:schemeClr val="lt1"/>
+          </a:fontRef>
+        </p:style>
+        <p:txBody>
+          <a:bodyPr rtlCol="0" anchor="ctr"/>
+          <a:lstStyle/>
+          <a:p>
+            <a:pPr algn="ctr"/>
+            <a:endParaRPr lang="pt-BR"/>
+          </a:p>
+        </p:txBody>
+      </p:sp>
+      <p:sp>
+        <p:nvSpPr>
+          <p:cNvPr id="58" name="Elipse 57">
+            <a:extLst>
+              <a:ext uri="{FF2B5EF4-FFF2-40B4-BE49-F238E27FC236}">
+                <a16:creationId xmlns:a16="http://schemas.microsoft.com/office/drawing/2014/main" id="{2A645CC4-6F49-44A3-CDCB-BC71A2C0549F}"/>
+              </a:ext>
+            </a:extLst>
+          </p:cNvPr>
+          <p:cNvSpPr/>
+          <p:nvPr/>
+        </p:nvSpPr>
+        <p:spPr>
+          <a:xfrm>
+            <a:off x="7626412" y="3523313"/>
+            <a:ext cx="72000" cy="72000"/>
+          </a:xfrm>
+          <a:prstGeom prst="ellipse">
+            <a:avLst/>
+          </a:prstGeom>
+          <a:solidFill>
+            <a:srgbClr val="C00000"/>
+          </a:solidFill>
+          <a:ln>
+            <a:noFill/>
+          </a:ln>
+        </p:spPr>
+        <p:style>
+          <a:lnRef idx="2">
+            <a:schemeClr val="accent1">
+              <a:shade val="15000"/>
+            </a:schemeClr>
+          </a:lnRef>
+          <a:fillRef idx="1">
+            <a:schemeClr val="accent1"/>
+          </a:fillRef>
+          <a:effectRef idx="0">
+            <a:schemeClr val="accent1"/>
+          </a:effectRef>
+          <a:fontRef idx="minor">
+            <a:schemeClr val="lt1"/>
+          </a:fontRef>
+        </p:style>
+        <p:txBody>
+          <a:bodyPr rtlCol="0" anchor="ctr"/>
+          <a:lstStyle/>
+          <a:p>
+            <a:pPr algn="ctr"/>
+            <a:endParaRPr lang="pt-BR"/>
+          </a:p>
+        </p:txBody>
+      </p:sp>
+      <p:sp>
+        <p:nvSpPr>
+          <p:cNvPr id="59" name="Elipse 58">
+            <a:extLst>
+              <a:ext uri="{FF2B5EF4-FFF2-40B4-BE49-F238E27FC236}">
+                <a16:creationId xmlns:a16="http://schemas.microsoft.com/office/drawing/2014/main" id="{14872A37-3B47-6B82-1F21-E2A20DCF6C68}"/>
+              </a:ext>
+            </a:extLst>
+          </p:cNvPr>
+          <p:cNvSpPr/>
+          <p:nvPr/>
+        </p:nvSpPr>
+        <p:spPr>
+          <a:xfrm>
+            <a:off x="8823746" y="3228944"/>
+            <a:ext cx="72000" cy="72000"/>
+          </a:xfrm>
+          <a:prstGeom prst="ellipse">
+            <a:avLst/>
+          </a:prstGeom>
+          <a:solidFill>
+            <a:schemeClr val="accent1"/>
+          </a:solidFill>
+          <a:ln>
+            <a:noFill/>
+          </a:ln>
+        </p:spPr>
+        <p:style>
+          <a:lnRef idx="2">
+            <a:schemeClr val="accent1">
+              <a:shade val="15000"/>
+            </a:schemeClr>
+          </a:lnRef>
+          <a:fillRef idx="1">
+            <a:schemeClr val="accent1"/>
+          </a:fillRef>
+          <a:effectRef idx="0">
+            <a:schemeClr val="accent1"/>
+          </a:effectRef>
+          <a:fontRef idx="minor">
+            <a:schemeClr val="lt1"/>
+          </a:fontRef>
+        </p:style>
+        <p:txBody>
+          <a:bodyPr rtlCol="0" anchor="ctr"/>
+          <a:lstStyle/>
+          <a:p>
+            <a:pPr algn="ctr"/>
+            <a:endParaRPr lang="pt-BR"/>
+          </a:p>
+        </p:txBody>
+      </p:sp>
+      <p:sp>
+        <p:nvSpPr>
+          <p:cNvPr id="60" name="Elipse 59">
+            <a:extLst>
+              <a:ext uri="{FF2B5EF4-FFF2-40B4-BE49-F238E27FC236}">
+                <a16:creationId xmlns:a16="http://schemas.microsoft.com/office/drawing/2014/main" id="{B8657D5C-FE38-F741-CF9A-A4DA686AA3D5}"/>
+              </a:ext>
+            </a:extLst>
+          </p:cNvPr>
+          <p:cNvSpPr/>
+          <p:nvPr/>
+        </p:nvSpPr>
+        <p:spPr>
+          <a:xfrm>
+            <a:off x="9138036" y="3367910"/>
+            <a:ext cx="72000" cy="72000"/>
+          </a:xfrm>
+          <a:prstGeom prst="ellipse">
+            <a:avLst/>
+          </a:prstGeom>
+          <a:solidFill>
+            <a:schemeClr val="accent1"/>
+          </a:solidFill>
+          <a:ln>
+            <a:noFill/>
+          </a:ln>
+        </p:spPr>
+        <p:style>
+          <a:lnRef idx="2">
+            <a:schemeClr val="accent1">
+              <a:shade val="15000"/>
+            </a:schemeClr>
+          </a:lnRef>
+          <a:fillRef idx="1">
+            <a:schemeClr val="accent1"/>
+          </a:fillRef>
+          <a:effectRef idx="0">
+            <a:schemeClr val="accent1"/>
+          </a:effectRef>
+          <a:fontRef idx="minor">
+            <a:schemeClr val="lt1"/>
+          </a:fontRef>
+        </p:style>
+        <p:txBody>
+          <a:bodyPr rtlCol="0" anchor="ctr"/>
+          <a:lstStyle/>
+          <a:p>
+            <a:pPr algn="ctr"/>
+            <a:endParaRPr lang="pt-BR"/>
+          </a:p>
+        </p:txBody>
+      </p:sp>
+      <p:sp>
+        <p:nvSpPr>
+          <p:cNvPr id="61" name="CaixaDeTexto 60">
+            <a:extLst>
+              <a:ext uri="{FF2B5EF4-FFF2-40B4-BE49-F238E27FC236}">
+                <a16:creationId xmlns:a16="http://schemas.microsoft.com/office/drawing/2014/main" id="{DACFD64B-E7E3-3EC5-821E-D513542FAA1A}"/>
+              </a:ext>
+            </a:extLst>
+          </p:cNvPr>
+          <p:cNvSpPr txBox="1"/>
+          <p:nvPr/>
+        </p:nvSpPr>
+        <p:spPr>
+          <a:xfrm>
+            <a:off x="5575771" y="1856092"/>
+            <a:ext cx="487634" cy="338554"/>
+          </a:xfrm>
+          <a:prstGeom prst="rect">
+            <a:avLst/>
+          </a:prstGeom>
+          <a:noFill/>
+        </p:spPr>
+        <p:txBody>
+          <a:bodyPr wrap="none" rtlCol="0">
+            <a:spAutoFit/>
+          </a:bodyPr>
+          <a:lstStyle/>
+          <a:p>
+            <a:r>
+              <a:rPr lang="pt-BR" sz="1600">
+                <a:solidFill>
+                  <a:srgbClr val="C00000"/>
+                </a:solidFill>
+              </a:rPr>
+              <a:t>4</a:t>
+            </a:r>
+            <a:r>
+              <a:rPr lang="pt-BR" sz="1600"/>
+              <a:t>|</a:t>
+            </a:r>
+            <a:r>
+              <a:rPr lang="pt-BR" sz="1600">
+                <a:solidFill>
+                  <a:schemeClr val="accent1"/>
+                </a:solidFill>
+              </a:rPr>
+              <a:t>4</a:t>
+            </a:r>
+          </a:p>
+        </p:txBody>
+      </p:sp>
+      <p:sp>
+        <p:nvSpPr>
+          <p:cNvPr id="62" name="CaixaDeTexto 61">
+            <a:extLst>
+              <a:ext uri="{FF2B5EF4-FFF2-40B4-BE49-F238E27FC236}">
+                <a16:creationId xmlns:a16="http://schemas.microsoft.com/office/drawing/2014/main" id="{87B0F464-23E3-0296-573D-BA08614B79F9}"/>
+              </a:ext>
+            </a:extLst>
+          </p:cNvPr>
+          <p:cNvSpPr txBox="1"/>
+          <p:nvPr/>
+        </p:nvSpPr>
+        <p:spPr>
+          <a:xfrm>
+            <a:off x="8116582" y="1862054"/>
+            <a:ext cx="487634" cy="338554"/>
+          </a:xfrm>
+          <a:prstGeom prst="rect">
+            <a:avLst/>
+          </a:prstGeom>
+          <a:noFill/>
+        </p:spPr>
+        <p:txBody>
+          <a:bodyPr wrap="none" rtlCol="0">
+            <a:spAutoFit/>
+          </a:bodyPr>
+          <a:lstStyle/>
+          <a:p>
+            <a:r>
+              <a:rPr lang="pt-BR" sz="1600">
+                <a:solidFill>
+                  <a:srgbClr val="C00000"/>
+                </a:solidFill>
+              </a:rPr>
+              <a:t>4</a:t>
+            </a:r>
+            <a:r>
+              <a:rPr lang="pt-BR" sz="1600"/>
+              <a:t>|</a:t>
+            </a:r>
+            <a:r>
+              <a:rPr lang="pt-BR" sz="1600">
+                <a:solidFill>
+                  <a:schemeClr val="accent1"/>
+                </a:solidFill>
+              </a:rPr>
+              <a:t>4</a:t>
+            </a:r>
+          </a:p>
+        </p:txBody>
+      </p:sp>
+      <p:sp>
+        <p:nvSpPr>
+          <p:cNvPr id="63" name="CaixaDeTexto 62">
+            <a:extLst>
+              <a:ext uri="{FF2B5EF4-FFF2-40B4-BE49-F238E27FC236}">
+                <a16:creationId xmlns:a16="http://schemas.microsoft.com/office/drawing/2014/main" id="{AD8935FB-2503-8940-C7B8-5F1B6C05196A}"/>
+              </a:ext>
+            </a:extLst>
+          </p:cNvPr>
+          <p:cNvSpPr txBox="1"/>
+          <p:nvPr/>
+        </p:nvSpPr>
+        <p:spPr>
+          <a:xfrm>
+            <a:off x="7380782" y="2649802"/>
+            <a:ext cx="487634" cy="338554"/>
+          </a:xfrm>
+          <a:prstGeom prst="rect">
+            <a:avLst/>
+          </a:prstGeom>
+          <a:noFill/>
+        </p:spPr>
+        <p:txBody>
+          <a:bodyPr wrap="none" rtlCol="0">
+            <a:spAutoFit/>
+          </a:bodyPr>
+          <a:lstStyle/>
+          <a:p>
+            <a:r>
+              <a:rPr lang="pt-BR" sz="1600">
+                <a:solidFill>
+                  <a:srgbClr val="C00000"/>
+                </a:solidFill>
+              </a:rPr>
+              <a:t>4</a:t>
+            </a:r>
+            <a:r>
+              <a:rPr lang="pt-BR" sz="1600"/>
+              <a:t>|</a:t>
+            </a:r>
+            <a:r>
+              <a:rPr lang="pt-BR" sz="1600">
+                <a:solidFill>
+                  <a:schemeClr val="accent1"/>
+                </a:solidFill>
+              </a:rPr>
+              <a:t>2</a:t>
+            </a:r>
+          </a:p>
+        </p:txBody>
+      </p:sp>
+      <p:sp>
+        <p:nvSpPr>
+          <p:cNvPr id="64" name="CaixaDeTexto 63">
+            <a:extLst>
+              <a:ext uri="{FF2B5EF4-FFF2-40B4-BE49-F238E27FC236}">
+                <a16:creationId xmlns:a16="http://schemas.microsoft.com/office/drawing/2014/main" id="{E38CBA8C-3799-3404-A358-CCC33D400B3B}"/>
+              </a:ext>
+            </a:extLst>
+          </p:cNvPr>
+          <p:cNvSpPr txBox="1"/>
+          <p:nvPr/>
+        </p:nvSpPr>
+        <p:spPr>
+          <a:xfrm>
+            <a:off x="8831971" y="2648019"/>
+            <a:ext cx="487634" cy="338554"/>
+          </a:xfrm>
+          <a:prstGeom prst="rect">
+            <a:avLst/>
+          </a:prstGeom>
+          <a:noFill/>
+        </p:spPr>
+        <p:txBody>
+          <a:bodyPr wrap="none" rtlCol="0">
+            <a:spAutoFit/>
+          </a:bodyPr>
+          <a:lstStyle/>
+          <a:p>
+            <a:r>
+              <a:rPr lang="pt-BR" sz="1600">
+                <a:solidFill>
+                  <a:srgbClr val="C00000"/>
+                </a:solidFill>
+              </a:rPr>
+              <a:t>0</a:t>
+            </a:r>
+            <a:r>
+              <a:rPr lang="pt-BR" sz="1600"/>
+              <a:t>|</a:t>
+            </a:r>
+            <a:r>
+              <a:rPr lang="pt-BR" sz="1600">
+                <a:solidFill>
+                  <a:schemeClr val="accent1"/>
+                </a:solidFill>
+              </a:rPr>
+              <a:t>2</a:t>
+            </a:r>
+          </a:p>
+        </p:txBody>
+      </p:sp>
+      <p:sp>
+        <p:nvSpPr>
+          <p:cNvPr id="65" name="CaixaDeTexto 64">
+            <a:extLst>
+              <a:ext uri="{FF2B5EF4-FFF2-40B4-BE49-F238E27FC236}">
+                <a16:creationId xmlns:a16="http://schemas.microsoft.com/office/drawing/2014/main" id="{5909E44C-CC13-93E1-9AA8-85A24AA36EBC}"/>
+              </a:ext>
+            </a:extLst>
+          </p:cNvPr>
+          <p:cNvSpPr txBox="1"/>
+          <p:nvPr/>
+        </p:nvSpPr>
+        <p:spPr>
+          <a:xfrm>
+            <a:off x="4844623" y="2633498"/>
+            <a:ext cx="487634" cy="338554"/>
+          </a:xfrm>
+          <a:prstGeom prst="rect">
+            <a:avLst/>
+          </a:prstGeom>
+          <a:noFill/>
+        </p:spPr>
+        <p:txBody>
+          <a:bodyPr wrap="none" rtlCol="0">
+            <a:spAutoFit/>
+          </a:bodyPr>
+          <a:lstStyle/>
+          <a:p>
+            <a:r>
+              <a:rPr lang="pt-BR" sz="1600">
+                <a:solidFill>
+                  <a:srgbClr val="C00000"/>
+                </a:solidFill>
+              </a:rPr>
+              <a:t>3</a:t>
+            </a:r>
+            <a:r>
+              <a:rPr lang="pt-BR" sz="1600"/>
+              <a:t>|</a:t>
+            </a:r>
+            <a:r>
+              <a:rPr lang="pt-BR" sz="1600">
+                <a:solidFill>
+                  <a:schemeClr val="accent1"/>
+                </a:solidFill>
+              </a:rPr>
+              <a:t>1</a:t>
+            </a:r>
+          </a:p>
+        </p:txBody>
+      </p:sp>
+      <p:sp>
+        <p:nvSpPr>
+          <p:cNvPr id="66" name="CaixaDeTexto 65">
+            <a:extLst>
+              <a:ext uri="{FF2B5EF4-FFF2-40B4-BE49-F238E27FC236}">
+                <a16:creationId xmlns:a16="http://schemas.microsoft.com/office/drawing/2014/main" id="{F55A9C8C-07FE-EBC1-3C1E-21BBB22961E1}"/>
+              </a:ext>
+            </a:extLst>
+          </p:cNvPr>
+          <p:cNvSpPr txBox="1"/>
+          <p:nvPr/>
+        </p:nvSpPr>
+        <p:spPr>
+          <a:xfrm>
+            <a:off x="6290707" y="2651343"/>
+            <a:ext cx="487634" cy="338554"/>
+          </a:xfrm>
+          <a:prstGeom prst="rect">
+            <a:avLst/>
+          </a:prstGeom>
+          <a:noFill/>
+        </p:spPr>
+        <p:txBody>
+          <a:bodyPr wrap="none" rtlCol="0">
+            <a:spAutoFit/>
+          </a:bodyPr>
+          <a:lstStyle/>
+          <a:p>
+            <a:r>
+              <a:rPr lang="pt-BR" sz="1600">
+                <a:solidFill>
+                  <a:srgbClr val="C00000"/>
+                </a:solidFill>
+              </a:rPr>
+              <a:t>1</a:t>
+            </a:r>
+            <a:r>
+              <a:rPr lang="pt-BR" sz="1600"/>
+              <a:t>|</a:t>
+            </a:r>
+            <a:r>
+              <a:rPr lang="pt-BR" sz="1600">
+                <a:solidFill>
+                  <a:schemeClr val="accent1"/>
+                </a:solidFill>
+              </a:rPr>
+              <a:t>3</a:t>
+            </a:r>
+          </a:p>
+        </p:txBody>
+      </p:sp>
+      <mc:AlternateContent xmlns:mc="http://schemas.openxmlformats.org/markup-compatibility/2006">
+        <mc:Choice xmlns:a14="http://schemas.microsoft.com/office/drawing/2010/main" Requires="a14">
+          <p:sp>
+            <p:nvSpPr>
+              <p:cNvPr id="67" name="CaixaDeTexto 66">
+                <a:extLst>
+                  <a:ext uri="{FF2B5EF4-FFF2-40B4-BE49-F238E27FC236}">
+                    <a16:creationId xmlns:a16="http://schemas.microsoft.com/office/drawing/2014/main" id="{480775DF-987C-AB22-2BCE-549A03A09620}"/>
+                  </a:ext>
+                </a:extLst>
+              </p:cNvPr>
+              <p:cNvSpPr txBox="1"/>
+              <p:nvPr/>
+            </p:nvSpPr>
+            <p:spPr>
+              <a:xfrm>
+                <a:off x="5070436" y="3749153"/>
+                <a:ext cx="1622175" cy="646331"/>
+              </a:xfrm>
+              <a:prstGeom prst="rect">
+                <a:avLst/>
+              </a:prstGeom>
+              <a:noFill/>
+            </p:spPr>
+            <p:txBody>
+              <a:bodyPr wrap="none" rtlCol="0">
+                <a:spAutoFit/>
+              </a:bodyPr>
+              <a:lstStyle/>
+              <a:p>
+                <a:r>
+                  <a:rPr lang="pt-BR" sz="1200" b="1"/>
+                  <a:t>Gini: </a:t>
+                </a:r>
+                <a14:m>
+                  <m:oMath xmlns:m="http://schemas.openxmlformats.org/officeDocument/2006/math">
+                    <m:r>
+                      <a:rPr lang="pt-BR" sz="1200" b="0" i="1" smtClean="0">
+                        <a:latin typeface="Cambria Math" panose="02040503050406030204" pitchFamily="18" charset="0"/>
+                      </a:rPr>
+                      <m:t>0,38</m:t>
+                    </m:r>
+                  </m:oMath>
+                </a14:m>
+                <a:br>
+                  <a:rPr lang="pt-BR" sz="1200"/>
+                </a:br>
+                <a:r>
+                  <a:rPr lang="pt-BR" sz="1200" b="1"/>
+                  <a:t>Entropia cruzada: </a:t>
+                </a:r>
+                <a14:m>
+                  <m:oMath xmlns:m="http://schemas.openxmlformats.org/officeDocument/2006/math">
+                    <m:r>
+                      <a:rPr lang="pt-BR" sz="1200" b="0" i="1" smtClean="0">
+                        <a:latin typeface="Cambria Math" panose="02040503050406030204" pitchFamily="18" charset="0"/>
+                      </a:rPr>
+                      <m:t>0,57</m:t>
+                    </m:r>
+                  </m:oMath>
+                </a14:m>
+                <a:br>
+                  <a:rPr lang="pt-BR" sz="1200"/>
+                </a:br>
+                <a:r>
+                  <a:rPr lang="pt-BR" sz="1200" b="1"/>
+                  <a:t>Taxa de erro: </a:t>
+                </a:r>
+                <a14:m>
+                  <m:oMath xmlns:m="http://schemas.openxmlformats.org/officeDocument/2006/math">
+                    <m:r>
+                      <a:rPr lang="pt-BR" sz="1200" b="0" i="1" smtClean="0">
+                        <a:latin typeface="Cambria Math" panose="02040503050406030204" pitchFamily="18" charset="0"/>
+                      </a:rPr>
+                      <m:t>0,25</m:t>
+                    </m:r>
+                  </m:oMath>
+                </a14:m>
+                <a:endParaRPr lang="pt-BR" sz="1200"/>
+              </a:p>
+            </p:txBody>
+          </p:sp>
+        </mc:Choice>
+        <mc:Fallback>
+          <p:sp>
+            <p:nvSpPr>
+              <p:cNvPr id="67" name="CaixaDeTexto 66">
+                <a:extLst>
+                  <a:ext uri="{FF2B5EF4-FFF2-40B4-BE49-F238E27FC236}">
+                    <a16:creationId xmlns:a16="http://schemas.microsoft.com/office/drawing/2014/main" id="{480775DF-987C-AB22-2BCE-549A03A09620}"/>
+                  </a:ext>
+                </a:extLst>
+              </p:cNvPr>
+              <p:cNvSpPr txBox="1">
+                <a:spLocks noRot="1" noChangeAspect="1" noMove="1" noResize="1" noEditPoints="1" noAdjustHandles="1" noChangeArrowheads="1" noChangeShapeType="1" noTextEdit="1"/>
+              </p:cNvSpPr>
+              <p:nvPr/>
+            </p:nvSpPr>
+            <p:spPr>
+              <a:xfrm>
+                <a:off x="5070436" y="3749153"/>
+                <a:ext cx="1622175" cy="646331"/>
+              </a:xfrm>
+              <a:prstGeom prst="rect">
+                <a:avLst/>
+              </a:prstGeom>
+              <a:blipFill>
+                <a:blip r:embed="rId2"/>
+                <a:stretch>
+                  <a:fillRect l="-376" b="-6604"/>
+                </a:stretch>
+              </a:blipFill>
+            </p:spPr>
+            <p:txBody>
+              <a:bodyPr/>
+              <a:lstStyle/>
+              <a:p>
+                <a:r>
+                  <a:rPr lang="pt-BR">
+                    <a:noFill/>
+                  </a:rPr>
+                  <a:t> </a:t>
+                </a:r>
+              </a:p>
+            </p:txBody>
+          </p:sp>
+        </mc:Fallback>
+      </mc:AlternateContent>
+      <mc:AlternateContent xmlns:mc="http://schemas.openxmlformats.org/markup-compatibility/2006">
+        <mc:Choice xmlns:a14="http://schemas.microsoft.com/office/drawing/2010/main" Requires="a14">
+          <p:sp>
+            <p:nvSpPr>
+              <p:cNvPr id="68" name="CaixaDeTexto 67">
+                <a:extLst>
+                  <a:ext uri="{FF2B5EF4-FFF2-40B4-BE49-F238E27FC236}">
+                    <a16:creationId xmlns:a16="http://schemas.microsoft.com/office/drawing/2014/main" id="{539DB655-22E7-EED6-3E9F-8950223FDE28}"/>
+                  </a:ext>
+                </a:extLst>
+              </p:cNvPr>
+              <p:cNvSpPr txBox="1"/>
+              <p:nvPr/>
+            </p:nvSpPr>
+            <p:spPr>
+              <a:xfrm>
+                <a:off x="7604353" y="3755115"/>
+                <a:ext cx="1622175" cy="646331"/>
+              </a:xfrm>
+              <a:prstGeom prst="rect">
+                <a:avLst/>
+              </a:prstGeom>
+              <a:noFill/>
+            </p:spPr>
+            <p:txBody>
+              <a:bodyPr wrap="none" rtlCol="0">
+                <a:spAutoFit/>
+              </a:bodyPr>
+              <a:lstStyle/>
+              <a:p>
+                <a:r>
+                  <a:rPr lang="pt-BR" sz="1200" b="1"/>
+                  <a:t>Gini: </a:t>
+                </a:r>
+                <a14:m>
+                  <m:oMath xmlns:m="http://schemas.openxmlformats.org/officeDocument/2006/math">
+                    <m:r>
+                      <a:rPr lang="pt-BR" sz="1200" b="0" i="1" smtClean="0">
+                        <a:latin typeface="Cambria Math" panose="02040503050406030204" pitchFamily="18" charset="0"/>
+                      </a:rPr>
+                      <m:t>0,33</m:t>
+                    </m:r>
+                  </m:oMath>
+                </a14:m>
+                <a:br>
+                  <a:rPr lang="pt-BR" sz="1200"/>
+                </a:br>
+                <a:r>
+                  <a:rPr lang="pt-BR" sz="1200" b="1"/>
+                  <a:t>Entropia cruzada: </a:t>
+                </a:r>
+                <a14:m>
+                  <m:oMath xmlns:m="http://schemas.openxmlformats.org/officeDocument/2006/math">
+                    <m:r>
+                      <a:rPr lang="pt-BR" sz="1200" b="0" i="1" smtClean="0">
+                        <a:latin typeface="Cambria Math" panose="02040503050406030204" pitchFamily="18" charset="0"/>
+                      </a:rPr>
+                      <m:t>0,48</m:t>
+                    </m:r>
+                  </m:oMath>
+                </a14:m>
+                <a:br>
+                  <a:rPr lang="pt-BR" sz="1200"/>
+                </a:br>
+                <a:r>
+                  <a:rPr lang="pt-BR" sz="1200" b="1"/>
+                  <a:t>Taxa de erro: </a:t>
+                </a:r>
+                <a14:m>
+                  <m:oMath xmlns:m="http://schemas.openxmlformats.org/officeDocument/2006/math">
+                    <m:r>
+                      <a:rPr lang="pt-BR" sz="1200" b="0" i="1" smtClean="0">
+                        <a:latin typeface="Cambria Math" panose="02040503050406030204" pitchFamily="18" charset="0"/>
+                      </a:rPr>
+                      <m:t>0,25</m:t>
+                    </m:r>
+                  </m:oMath>
+                </a14:m>
+                <a:endParaRPr lang="pt-BR" sz="1200"/>
+              </a:p>
+            </p:txBody>
+          </p:sp>
+        </mc:Choice>
+        <mc:Fallback>
+          <p:sp>
+            <p:nvSpPr>
+              <p:cNvPr id="68" name="CaixaDeTexto 67">
+                <a:extLst>
+                  <a:ext uri="{FF2B5EF4-FFF2-40B4-BE49-F238E27FC236}">
+                    <a16:creationId xmlns:a16="http://schemas.microsoft.com/office/drawing/2014/main" id="{539DB655-22E7-EED6-3E9F-8950223FDE28}"/>
+                  </a:ext>
+                </a:extLst>
+              </p:cNvPr>
+              <p:cNvSpPr txBox="1">
+                <a:spLocks noRot="1" noChangeAspect="1" noMove="1" noResize="1" noEditPoints="1" noAdjustHandles="1" noChangeArrowheads="1" noChangeShapeType="1" noTextEdit="1"/>
+              </p:cNvSpPr>
+              <p:nvPr/>
+            </p:nvSpPr>
+            <p:spPr>
+              <a:xfrm>
+                <a:off x="7604353" y="3755115"/>
+                <a:ext cx="1622175" cy="646331"/>
+              </a:xfrm>
+              <a:prstGeom prst="rect">
+                <a:avLst/>
+              </a:prstGeom>
+              <a:blipFill>
+                <a:blip r:embed="rId3"/>
+                <a:stretch>
+                  <a:fillRect t="-943" b="-6604"/>
+                </a:stretch>
+              </a:blipFill>
+            </p:spPr>
+            <p:txBody>
+              <a:bodyPr/>
+              <a:lstStyle/>
+              <a:p>
+                <a:r>
+                  <a:rPr lang="pt-BR">
+                    <a:noFill/>
+                  </a:rPr>
+                  <a:t> </a:t>
+                </a:r>
+              </a:p>
+            </p:txBody>
+          </p:sp>
+        </mc:Fallback>
+      </mc:AlternateContent>
+    </p:spTree>
+    <p:extLst>
+      <p:ext uri="{BB962C8B-B14F-4D97-AF65-F5344CB8AC3E}">
+        <p14:creationId xmlns:p14="http://schemas.microsoft.com/office/powerpoint/2010/main" val="1266750268"/>
       </p:ext>
     </p:extLst>
   </p:cSld>

</xml_diff>